<commit_message>
removed bug arduino programma
</commit_message>
<xml_diff>
--- a/_Administratie/Presentatie GIP.pptx
+++ b/_Administratie/Presentatie GIP.pptx
@@ -5,21 +5,22 @@
     <p:sldMasterId id="2147483695" r:id="rId1"/>
   </p:sldMasterIdLst>
   <p:notesMasterIdLst>
-    <p:notesMasterId r:id="rId14"/>
+    <p:notesMasterId r:id="rId15"/>
   </p:notesMasterIdLst>
   <p:sldIdLst>
     <p:sldId id="256" r:id="rId2"/>
-    <p:sldId id="257" r:id="rId3"/>
-    <p:sldId id="270" r:id="rId4"/>
-    <p:sldId id="269" r:id="rId5"/>
-    <p:sldId id="271" r:id="rId6"/>
-    <p:sldId id="272" r:id="rId7"/>
-    <p:sldId id="275" r:id="rId8"/>
-    <p:sldId id="276" r:id="rId9"/>
-    <p:sldId id="274" r:id="rId10"/>
-    <p:sldId id="273" r:id="rId11"/>
-    <p:sldId id="277" r:id="rId12"/>
-    <p:sldId id="278" r:id="rId13"/>
+    <p:sldId id="279" r:id="rId3"/>
+    <p:sldId id="257" r:id="rId4"/>
+    <p:sldId id="270" r:id="rId5"/>
+    <p:sldId id="269" r:id="rId6"/>
+    <p:sldId id="271" r:id="rId7"/>
+    <p:sldId id="272" r:id="rId8"/>
+    <p:sldId id="275" r:id="rId9"/>
+    <p:sldId id="276" r:id="rId10"/>
+    <p:sldId id="274" r:id="rId11"/>
+    <p:sldId id="273" r:id="rId12"/>
+    <p:sldId id="277" r:id="rId13"/>
+    <p:sldId id="278" r:id="rId14"/>
   </p:sldIdLst>
   <p:sldSz cx="12192000" cy="6858000"/>
   <p:notesSz cx="6858000" cy="9144000"/>
@@ -208,7 +209,7 @@
           <a:p>
             <a:fld id="{301D66A4-ABC3-4C44-A698-86811F34C74C}" type="datetimeFigureOut">
               <a:rPr lang="nl-NL" smtClean="0"/>
-              <a:t>9-5-2019</a:t>
+              <a:t>13-5-2019</a:t>
             </a:fld>
             <a:endParaRPr lang="nl-NL"/>
           </a:p>
@@ -642,7 +643,7 @@
           <a:p>
             <a:fld id="{B1914E6F-C347-4F2C-9B55-B862DB75823B}" type="slidenum">
               <a:rPr lang="nl-NL" smtClean="0"/>
-              <a:t>10</a:t>
+              <a:t>11</a:t>
             </a:fld>
             <a:endParaRPr lang="nl-NL"/>
           </a:p>
@@ -763,7 +764,7 @@
           <a:p>
             <a:fld id="{B1914E6F-C347-4F2C-9B55-B862DB75823B}" type="slidenum">
               <a:rPr lang="nl-NL" smtClean="0"/>
-              <a:t>11</a:t>
+              <a:t>12</a:t>
             </a:fld>
             <a:endParaRPr lang="nl-NL"/>
           </a:p>
@@ -847,7 +848,7 @@
           <a:p>
             <a:fld id="{B1914E6F-C347-4F2C-9B55-B862DB75823B}" type="slidenum">
               <a:rPr lang="nl-NL" smtClean="0"/>
-              <a:t>12</a:t>
+              <a:t>13</a:t>
             </a:fld>
             <a:endParaRPr lang="nl-NL"/>
           </a:p>
@@ -934,7 +935,7 @@
           <a:p>
             <a:fld id="{B1914E6F-C347-4F2C-9B55-B862DB75823B}" type="slidenum">
               <a:rPr lang="nl-NL" smtClean="0"/>
-              <a:t>2</a:t>
+              <a:t>3</a:t>
             </a:fld>
             <a:endParaRPr lang="nl-NL"/>
           </a:p>
@@ -1021,7 +1022,7 @@
           <a:p>
             <a:fld id="{B1914E6F-C347-4F2C-9B55-B862DB75823B}" type="slidenum">
               <a:rPr lang="nl-NL" smtClean="0"/>
-              <a:t>3</a:t>
+              <a:t>4</a:t>
             </a:fld>
             <a:endParaRPr lang="nl-NL"/>
           </a:p>
@@ -1105,7 +1106,7 @@
           <a:p>
             <a:fld id="{B1914E6F-C347-4F2C-9B55-B862DB75823B}" type="slidenum">
               <a:rPr lang="nl-NL" smtClean="0"/>
-              <a:t>4</a:t>
+              <a:t>5</a:t>
             </a:fld>
             <a:endParaRPr lang="nl-NL"/>
           </a:p>
@@ -1192,7 +1193,7 @@
           <a:p>
             <a:fld id="{B1914E6F-C347-4F2C-9B55-B862DB75823B}" type="slidenum">
               <a:rPr lang="nl-NL" smtClean="0"/>
-              <a:t>5</a:t>
+              <a:t>6</a:t>
             </a:fld>
             <a:endParaRPr lang="nl-NL"/>
           </a:p>
@@ -1295,7 +1296,7 @@
           <a:p>
             <a:fld id="{B1914E6F-C347-4F2C-9B55-B862DB75823B}" type="slidenum">
               <a:rPr lang="nl-NL" smtClean="0"/>
-              <a:t>6</a:t>
+              <a:t>7</a:t>
             </a:fld>
             <a:endParaRPr lang="nl-NL"/>
           </a:p>
@@ -1379,7 +1380,7 @@
           <a:p>
             <a:fld id="{B1914E6F-C347-4F2C-9B55-B862DB75823B}" type="slidenum">
               <a:rPr lang="nl-NL" smtClean="0"/>
-              <a:t>7</a:t>
+              <a:t>8</a:t>
             </a:fld>
             <a:endParaRPr lang="nl-NL"/>
           </a:p>
@@ -1463,7 +1464,7 @@
           <a:p>
             <a:fld id="{B1914E6F-C347-4F2C-9B55-B862DB75823B}" type="slidenum">
               <a:rPr lang="nl-NL" smtClean="0"/>
-              <a:t>8</a:t>
+              <a:t>9</a:t>
             </a:fld>
             <a:endParaRPr lang="nl-NL"/>
           </a:p>
@@ -1547,7 +1548,7 @@
           <a:p>
             <a:fld id="{B1914E6F-C347-4F2C-9B55-B862DB75823B}" type="slidenum">
               <a:rPr lang="nl-NL" smtClean="0"/>
-              <a:t>9</a:t>
+              <a:t>10</a:t>
             </a:fld>
             <a:endParaRPr lang="nl-NL"/>
           </a:p>
@@ -1752,7 +1753,7 @@
           <a:p>
             <a:fld id="{12F0C58C-007D-453E-BDD8-6C2CB8665497}" type="datetimeFigureOut">
               <a:rPr lang="nl-NL" smtClean="0"/>
-              <a:t>9-5-2019</a:t>
+              <a:t>13-5-2019</a:t>
             </a:fld>
             <a:endParaRPr lang="nl-NL"/>
           </a:p>
@@ -2027,7 +2028,7 @@
           <a:p>
             <a:fld id="{12F0C58C-007D-453E-BDD8-6C2CB8665497}" type="datetimeFigureOut">
               <a:rPr lang="nl-NL" smtClean="0"/>
-              <a:t>9-5-2019</a:t>
+              <a:t>13-5-2019</a:t>
             </a:fld>
             <a:endParaRPr lang="nl-NL"/>
           </a:p>
@@ -2221,7 +2222,7 @@
           <a:p>
             <a:fld id="{12F0C58C-007D-453E-BDD8-6C2CB8665497}" type="datetimeFigureOut">
               <a:rPr lang="nl-NL" smtClean="0"/>
-              <a:t>9-5-2019</a:t>
+              <a:t>13-5-2019</a:t>
             </a:fld>
             <a:endParaRPr lang="nl-NL"/>
           </a:p>
@@ -2494,7 +2495,7 @@
           <a:p>
             <a:fld id="{12F0C58C-007D-453E-BDD8-6C2CB8665497}" type="datetimeFigureOut">
               <a:rPr lang="nl-NL" smtClean="0"/>
-              <a:t>9-5-2019</a:t>
+              <a:t>13-5-2019</a:t>
             </a:fld>
             <a:endParaRPr lang="nl-NL"/>
           </a:p>
@@ -2835,7 +2836,7 @@
           <a:p>
             <a:fld id="{12F0C58C-007D-453E-BDD8-6C2CB8665497}" type="datetimeFigureOut">
               <a:rPr lang="nl-NL" smtClean="0"/>
-              <a:t>9-5-2019</a:t>
+              <a:t>13-5-2019</a:t>
             </a:fld>
             <a:endParaRPr lang="nl-NL"/>
           </a:p>
@@ -3458,7 +3459,7 @@
           <a:p>
             <a:fld id="{12F0C58C-007D-453E-BDD8-6C2CB8665497}" type="datetimeFigureOut">
               <a:rPr lang="nl-NL" smtClean="0"/>
-              <a:t>9-5-2019</a:t>
+              <a:t>13-5-2019</a:t>
             </a:fld>
             <a:endParaRPr lang="nl-NL"/>
           </a:p>
@@ -4318,7 +4319,7 @@
           <a:p>
             <a:fld id="{12F0C58C-007D-453E-BDD8-6C2CB8665497}" type="datetimeFigureOut">
               <a:rPr lang="nl-NL" smtClean="0"/>
-              <a:t>9-5-2019</a:t>
+              <a:t>13-5-2019</a:t>
             </a:fld>
             <a:endParaRPr lang="nl-NL"/>
           </a:p>
@@ -4488,7 +4489,7 @@
           <a:p>
             <a:fld id="{12F0C58C-007D-453E-BDD8-6C2CB8665497}" type="datetimeFigureOut">
               <a:rPr lang="nl-NL" smtClean="0"/>
-              <a:t>9-5-2019</a:t>
+              <a:t>13-5-2019</a:t>
             </a:fld>
             <a:endParaRPr lang="nl-NL"/>
           </a:p>
@@ -4668,7 +4669,7 @@
           <a:p>
             <a:fld id="{12F0C58C-007D-453E-BDD8-6C2CB8665497}" type="datetimeFigureOut">
               <a:rPr lang="nl-NL" smtClean="0"/>
-              <a:t>9-5-2019</a:t>
+              <a:t>13-5-2019</a:t>
             </a:fld>
             <a:endParaRPr lang="nl-NL"/>
           </a:p>
@@ -4838,7 +4839,7 @@
           <a:p>
             <a:fld id="{12F0C58C-007D-453E-BDD8-6C2CB8665497}" type="datetimeFigureOut">
               <a:rPr lang="nl-NL" smtClean="0"/>
-              <a:t>9-5-2019</a:t>
+              <a:t>13-5-2019</a:t>
             </a:fld>
             <a:endParaRPr lang="nl-NL"/>
           </a:p>
@@ -5085,7 +5086,7 @@
           <a:p>
             <a:fld id="{12F0C58C-007D-453E-BDD8-6C2CB8665497}" type="datetimeFigureOut">
               <a:rPr lang="nl-NL" smtClean="0"/>
-              <a:t>9-5-2019</a:t>
+              <a:t>13-5-2019</a:t>
             </a:fld>
             <a:endParaRPr lang="nl-NL"/>
           </a:p>
@@ -5377,7 +5378,7 @@
           <a:p>
             <a:fld id="{12F0C58C-007D-453E-BDD8-6C2CB8665497}" type="datetimeFigureOut">
               <a:rPr lang="nl-NL" smtClean="0"/>
-              <a:t>9-5-2019</a:t>
+              <a:t>13-5-2019</a:t>
             </a:fld>
             <a:endParaRPr lang="nl-NL"/>
           </a:p>
@@ -5821,7 +5822,7 @@
           <a:p>
             <a:fld id="{12F0C58C-007D-453E-BDD8-6C2CB8665497}" type="datetimeFigureOut">
               <a:rPr lang="nl-NL" smtClean="0"/>
-              <a:t>9-5-2019</a:t>
+              <a:t>13-5-2019</a:t>
             </a:fld>
             <a:endParaRPr lang="nl-NL"/>
           </a:p>
@@ -5939,7 +5940,7 @@
           <a:p>
             <a:fld id="{12F0C58C-007D-453E-BDD8-6C2CB8665497}" type="datetimeFigureOut">
               <a:rPr lang="nl-NL" smtClean="0"/>
-              <a:t>9-5-2019</a:t>
+              <a:t>13-5-2019</a:t>
             </a:fld>
             <a:endParaRPr lang="nl-NL"/>
           </a:p>
@@ -6034,7 +6035,7 @@
           <a:p>
             <a:fld id="{12F0C58C-007D-453E-BDD8-6C2CB8665497}" type="datetimeFigureOut">
               <a:rPr lang="nl-NL" smtClean="0"/>
-              <a:t>9-5-2019</a:t>
+              <a:t>13-5-2019</a:t>
             </a:fld>
             <a:endParaRPr lang="nl-NL"/>
           </a:p>
@@ -6313,7 +6314,7 @@
           <a:p>
             <a:fld id="{12F0C58C-007D-453E-BDD8-6C2CB8665497}" type="datetimeFigureOut">
               <a:rPr lang="nl-NL" smtClean="0"/>
-              <a:t>9-5-2019</a:t>
+              <a:t>13-5-2019</a:t>
             </a:fld>
             <a:endParaRPr lang="nl-NL"/>
           </a:p>
@@ -6588,7 +6589,7 @@
           <a:p>
             <a:fld id="{12F0C58C-007D-453E-BDD8-6C2CB8665497}" type="datetimeFigureOut">
               <a:rPr lang="nl-NL" smtClean="0"/>
-              <a:t>9-5-2019</a:t>
+              <a:t>13-5-2019</a:t>
             </a:fld>
             <a:endParaRPr lang="nl-NL"/>
           </a:p>
@@ -7017,7 +7018,7 @@
           <a:p>
             <a:fld id="{12F0C58C-007D-453E-BDD8-6C2CB8665497}" type="datetimeFigureOut">
               <a:rPr lang="nl-NL" smtClean="0"/>
-              <a:t>9-5-2019</a:t>
+              <a:t>13-5-2019</a:t>
             </a:fld>
             <a:endParaRPr lang="nl-NL"/>
           </a:p>
@@ -7618,18 +7619,6 @@
                   </a:schemeClr>
                 </a:solidFill>
               </a:rPr>
-              <a:t>Led kubus</a:t>
-            </a:r>
-          </a:p>
-          <a:p>
-            <a:r>
-              <a:rPr lang="nl-NL" dirty="0">
-                <a:solidFill>
-                  <a:schemeClr val="tx1">
-                    <a:lumMod val="95000"/>
-                  </a:schemeClr>
-                </a:solidFill>
-              </a:rPr>
               <a:t>Sebastiaan Sillis</a:t>
             </a:r>
           </a:p>
@@ -7652,6 +7641,1796 @@
 </file>
 
 <file path=ppt/slides/slide10.xml><?xml version="1.0" encoding="utf-8"?>
+<p:sld xmlns:a="http://schemas.openxmlformats.org/drawingml/2006/main" xmlns:r="http://schemas.openxmlformats.org/officeDocument/2006/relationships" xmlns:p="http://schemas.openxmlformats.org/presentationml/2006/main">
+  <p:cSld>
+    <p:spTree>
+      <p:nvGrpSpPr>
+        <p:cNvPr id="1" name=""/>
+        <p:cNvGrpSpPr/>
+        <p:nvPr/>
+      </p:nvGrpSpPr>
+      <p:grpSpPr>
+        <a:xfrm>
+          <a:off x="0" y="0"/>
+          <a:ext cx="0" cy="0"/>
+          <a:chOff x="0" y="0"/>
+          <a:chExt cx="0" cy="0"/>
+        </a:xfrm>
+      </p:grpSpPr>
+      <p:sp>
+        <p:nvSpPr>
+          <p:cNvPr id="2" name="Titel 1"/>
+          <p:cNvSpPr>
+            <a:spLocks noGrp="1"/>
+          </p:cNvSpPr>
+          <p:nvPr>
+            <p:ph type="title"/>
+          </p:nvPr>
+        </p:nvSpPr>
+        <p:spPr/>
+        <p:txBody>
+          <a:bodyPr/>
+          <a:lstStyle/>
+          <a:p>
+            <a:r>
+              <a:rPr lang="nl-NL" sz="1800" dirty="0"/>
+              <a:t>Arp </a:t>
+            </a:r>
+            <a:r>
+              <a:rPr lang="nl-NL" sz="1800" dirty="0" err="1"/>
+              <a:t>Spoofing</a:t>
+            </a:r>
+            <a:endParaRPr lang="nl-NL" sz="1800" dirty="0"/>
+          </a:p>
+        </p:txBody>
+      </p:sp>
+      <p:grpSp>
+        <p:nvGrpSpPr>
+          <p:cNvPr id="13" name="Groep 12">
+            <a:extLst>
+              <a:ext uri="{FF2B5EF4-FFF2-40B4-BE49-F238E27FC236}">
+                <a16:creationId xmlns:a16="http://schemas.microsoft.com/office/drawing/2014/main" id="{EF8FA028-9C3F-403C-8BB0-1E5E5D5629A6}"/>
+              </a:ext>
+            </a:extLst>
+          </p:cNvPr>
+          <p:cNvGrpSpPr/>
+          <p:nvPr/>
+        </p:nvGrpSpPr>
+        <p:grpSpPr>
+          <a:xfrm>
+            <a:off x="1693185" y="1174800"/>
+            <a:ext cx="2251836" cy="1400530"/>
+            <a:chOff x="2667000" y="1143000"/>
+            <a:chExt cx="6858000" cy="4572000"/>
+          </a:xfrm>
+        </p:grpSpPr>
+        <p:pic>
+          <p:nvPicPr>
+            <p:cNvPr id="1026" name="Picture 2" descr="Afbeeldingsresultaat voor computer razerblade">
+              <a:extLst>
+                <a:ext uri="{FF2B5EF4-FFF2-40B4-BE49-F238E27FC236}">
+                  <a16:creationId xmlns:a16="http://schemas.microsoft.com/office/drawing/2014/main" id="{A8BBE771-0BF0-4657-87DF-B46171A91763}"/>
+                </a:ext>
+              </a:extLst>
+            </p:cNvPr>
+            <p:cNvPicPr>
+              <a:picLocks noChangeAspect="1" noChangeArrowheads="1"/>
+            </p:cNvPicPr>
+            <p:nvPr/>
+          </p:nvPicPr>
+          <p:blipFill>
+            <a:blip r:embed="rId3" cstate="print">
+              <a:duotone>
+                <a:prstClr val="black"/>
+                <a:srgbClr val="FF0000">
+                  <a:tint val="45000"/>
+                  <a:satMod val="400000"/>
+                </a:srgbClr>
+              </a:duotone>
+              <a:extLst>
+                <a:ext uri="{BEBA8EAE-BF5A-486C-A8C5-ECC9F3942E4B}">
+                  <a14:imgProps xmlns:a14="http://schemas.microsoft.com/office/drawing/2010/main">
+                    <a14:imgLayer r:embed="rId4">
+                      <a14:imgEffect>
+                        <a14:backgroundRemoval t="8958" b="90000" l="10000" r="90000">
+                          <a14:foregroundMark x1="28472" y1="50417" x2="15139" y2="88750"/>
+                          <a14:foregroundMark x1="15139" y1="88750" x2="37083" y2="91458"/>
+                          <a14:foregroundMark x1="37083" y1="91458" x2="51806" y2="88542"/>
+                          <a14:foregroundMark x1="51806" y1="88542" x2="77083" y2="90417"/>
+                          <a14:foregroundMark x1="77083" y1="90417" x2="84167" y2="88958"/>
+                          <a14:foregroundMark x1="84167" y1="88958" x2="84444" y2="77292"/>
+                          <a14:foregroundMark x1="84444" y1="77292" x2="79306" y2="67292"/>
+                          <a14:foregroundMark x1="79306" y1="67292" x2="74861" y2="27083"/>
+                          <a14:foregroundMark x1="74861" y1="27083" x2="74722" y2="16250"/>
+                          <a14:foregroundMark x1="74722" y1="16250" x2="68611" y2="11042"/>
+                          <a14:foregroundMark x1="68611" y1="11042" x2="61667" y2="8958"/>
+                          <a14:foregroundMark x1="61667" y1="8958" x2="39444" y2="12083"/>
+                          <a14:foregroundMark x1="39444" y1="12083" x2="29861" y2="10000"/>
+                        </a14:backgroundRemoval>
+                      </a14:imgEffect>
+                    </a14:imgLayer>
+                  </a14:imgProps>
+                </a:ext>
+                <a:ext uri="{28A0092B-C50C-407E-A947-70E740481C1C}">
+                  <a14:useLocalDpi xmlns:a14="http://schemas.microsoft.com/office/drawing/2010/main" val="0"/>
+                </a:ext>
+              </a:extLst>
+            </a:blip>
+            <a:srcRect/>
+            <a:stretch>
+              <a:fillRect/>
+            </a:stretch>
+          </p:blipFill>
+          <p:spPr bwMode="auto">
+            <a:xfrm>
+              <a:off x="2667000" y="1143000"/>
+              <a:ext cx="6858000" cy="4572000"/>
+            </a:xfrm>
+            <a:prstGeom prst="rect">
+              <a:avLst/>
+            </a:prstGeom>
+            <a:noFill/>
+            <a:extLst>
+              <a:ext uri="{909E8E84-426E-40DD-AFC4-6F175D3DCCD1}">
+                <a14:hiddenFill xmlns:a14="http://schemas.microsoft.com/office/drawing/2010/main">
+                  <a:solidFill>
+                    <a:srgbClr val="FFFFFF"/>
+                  </a:solidFill>
+                </a14:hiddenFill>
+              </a:ext>
+            </a:extLst>
+          </p:spPr>
+        </p:pic>
+        <p:sp>
+          <p:nvSpPr>
+            <p:cNvPr id="12" name="Rechthoek 11">
+              <a:extLst>
+                <a:ext uri="{FF2B5EF4-FFF2-40B4-BE49-F238E27FC236}">
+                  <a16:creationId xmlns:a16="http://schemas.microsoft.com/office/drawing/2014/main" id="{E92C533C-2713-426B-933C-69C055F20E83}"/>
+                </a:ext>
+              </a:extLst>
+            </p:cNvPr>
+            <p:cNvSpPr/>
+            <p:nvPr/>
+          </p:nvSpPr>
+          <p:spPr>
+            <a:xfrm>
+              <a:off x="4109662" y="1530849"/>
+              <a:ext cx="4027471" cy="2393879"/>
+            </a:xfrm>
+            <a:prstGeom prst="rect">
+              <a:avLst/>
+            </a:prstGeom>
+          </p:spPr>
+          <p:style>
+            <a:lnRef idx="2">
+              <a:schemeClr val="dk1">
+                <a:shade val="50000"/>
+              </a:schemeClr>
+            </a:lnRef>
+            <a:fillRef idx="1">
+              <a:schemeClr val="dk1"/>
+            </a:fillRef>
+            <a:effectRef idx="0">
+              <a:schemeClr val="dk1"/>
+            </a:effectRef>
+            <a:fontRef idx="minor">
+              <a:schemeClr val="lt1"/>
+            </a:fontRef>
+          </p:style>
+          <p:txBody>
+            <a:bodyPr rtlCol="0" anchor="ctr"/>
+            <a:lstStyle/>
+            <a:p>
+              <a:pPr algn="ctr"/>
+              <a:r>
+                <a:rPr lang="nl-NL" sz="2000" b="1" dirty="0">
+                  <a:solidFill>
+                    <a:srgbClr val="FF0000"/>
+                  </a:solidFill>
+                </a:rPr>
+                <a:t>HACKER</a:t>
+              </a:r>
+            </a:p>
+          </p:txBody>
+        </p:sp>
+      </p:grpSp>
+      <p:grpSp>
+        <p:nvGrpSpPr>
+          <p:cNvPr id="16" name="Groep 15">
+            <a:extLst>
+              <a:ext uri="{FF2B5EF4-FFF2-40B4-BE49-F238E27FC236}">
+                <a16:creationId xmlns:a16="http://schemas.microsoft.com/office/drawing/2014/main" id="{A0751BA8-8259-43A6-9062-78FE902E1DE6}"/>
+              </a:ext>
+            </a:extLst>
+          </p:cNvPr>
+          <p:cNvGrpSpPr/>
+          <p:nvPr/>
+        </p:nvGrpSpPr>
+        <p:grpSpPr>
+          <a:xfrm>
+            <a:off x="1153090" y="4977992"/>
+            <a:ext cx="2559333" cy="1233836"/>
+            <a:chOff x="5546977" y="2557328"/>
+            <a:chExt cx="3463459" cy="1877195"/>
+          </a:xfrm>
+        </p:grpSpPr>
+        <p:pic>
+          <p:nvPicPr>
+            <p:cNvPr id="14" name="Afbeelding 13">
+              <a:extLst>
+                <a:ext uri="{FF2B5EF4-FFF2-40B4-BE49-F238E27FC236}">
+                  <a16:creationId xmlns:a16="http://schemas.microsoft.com/office/drawing/2014/main" id="{54884391-9763-4752-9596-B2017AB49B9F}"/>
+                </a:ext>
+              </a:extLst>
+            </p:cNvPr>
+            <p:cNvPicPr>
+              <a:picLocks noChangeAspect="1"/>
+            </p:cNvPicPr>
+            <p:nvPr/>
+          </p:nvPicPr>
+          <p:blipFill>
+            <a:blip r:embed="rId5">
+              <a:extLst>
+                <a:ext uri="{BEBA8EAE-BF5A-486C-A8C5-ECC9F3942E4B}">
+                  <a14:imgProps xmlns:a14="http://schemas.microsoft.com/office/drawing/2010/main">
+                    <a14:imgLayer r:embed="rId6">
+                      <a14:imgEffect>
+                        <a14:backgroundRemoval t="0" b="97048" l="3800" r="90000">
+                          <a14:foregroundMark x1="24600" y1="16605" x2="17600" y2="11439"/>
+                          <a14:foregroundMark x1="17600" y1="16974" x2="18400" y2="52399"/>
+                          <a14:foregroundMark x1="16800" y1="11439" x2="25800" y2="3690"/>
+                          <a14:foregroundMark x1="25800" y1="3690" x2="48600" y2="0"/>
+                          <a14:foregroundMark x1="48600" y1="0" x2="64600" y2="738"/>
+                          <a14:foregroundMark x1="64600" y1="738" x2="66600" y2="2952"/>
+                          <a14:foregroundMark x1="44200" y1="59041" x2="44200" y2="59041"/>
+                          <a14:foregroundMark x1="47000" y1="59410" x2="67800" y2="57565"/>
+                          <a14:foregroundMark x1="67800" y1="57565" x2="69600" y2="2583"/>
+                          <a14:foregroundMark x1="48400" y1="57565" x2="18600" y2="54613"/>
+                          <a14:foregroundMark x1="34600" y1="59041" x2="34600" y2="59041"/>
+                          <a14:foregroundMark x1="34200" y1="59779" x2="30200" y2="61255"/>
+                          <a14:foregroundMark x1="29600" y1="61255" x2="28200" y2="61255"/>
+                          <a14:foregroundMark x1="25800" y1="59779" x2="25800" y2="59779"/>
+                          <a14:foregroundMark x1="24400" y1="59779" x2="23800" y2="59779"/>
+                          <a14:foregroundMark x1="22800" y1="59041" x2="22000" y2="58303"/>
+                          <a14:foregroundMark x1="17400" y1="10701" x2="25200" y2="369"/>
+                          <a14:foregroundMark x1="34600" y1="57934" x2="44800" y2="58672"/>
+                          <a14:foregroundMark x1="44800" y1="58672" x2="46400" y2="58303"/>
+                          <a14:foregroundMark x1="69200" y1="26199" x2="68400" y2="59779"/>
+                          <a14:foregroundMark x1="12400" y1="90037" x2="22800" y2="92989"/>
+                          <a14:foregroundMark x1="22800" y1="92989" x2="45600" y2="86716"/>
+                          <a14:foregroundMark x1="45600" y1="86716" x2="56600" y2="86716"/>
+                          <a14:foregroundMark x1="56600" y1="86716" x2="66200" y2="84871"/>
+                          <a14:foregroundMark x1="22000" y1="85609" x2="10800" y2="91144"/>
+                          <a14:foregroundMark x1="12200" y1="90775" x2="17400" y2="85240"/>
+                          <a14:foregroundMark x1="12600" y1="90406" x2="9000" y2="83395"/>
+                          <a14:foregroundMark x1="10200" y1="82657" x2="10200" y2="82657"/>
+                          <a14:foregroundMark x1="10200" y1="82657" x2="11600" y2="82657"/>
+                          <a14:foregroundMark x1="13600" y1="83395" x2="13600" y2="83395"/>
+                          <a14:foregroundMark x1="15200" y1="83764" x2="15800" y2="83764"/>
+                          <a14:foregroundMark x1="16800" y1="83764" x2="16800" y2="83764"/>
+                          <a14:foregroundMark x1="17200" y1="83764" x2="17200" y2="83764"/>
+                          <a14:foregroundMark x1="17000" y1="82288" x2="15000" y2="82288"/>
+                          <a14:foregroundMark x1="7200" y1="88192" x2="7600" y2="90775"/>
+                          <a14:foregroundMark x1="8200" y1="93358" x2="8200" y2="93358"/>
+                          <a14:foregroundMark x1="8200" y1="93358" x2="8200" y2="93358"/>
+                          <a14:foregroundMark x1="7800" y1="93358" x2="8600" y2="92989"/>
+                          <a14:foregroundMark x1="42600" y1="97048" x2="42600" y2="97048"/>
+                          <a14:foregroundMark x1="40000" y1="96679" x2="40000" y2="96679"/>
+                          <a14:foregroundMark x1="34400" y1="97048" x2="30800" y2="97048"/>
+                          <a14:foregroundMark x1="7800" y1="96679" x2="7800" y2="96679"/>
+                          <a14:foregroundMark x1="11800" y1="94834" x2="21800" y2="95941"/>
+                          <a14:foregroundMark x1="21800" y1="95941" x2="28600" y2="95203"/>
+                          <a14:foregroundMark x1="5400" y1="94834" x2="3800" y2="96310"/>
+                        </a14:backgroundRemoval>
+                      </a14:imgEffect>
+                    </a14:imgLayer>
+                  </a14:imgProps>
+                </a:ext>
+              </a:extLst>
+            </a:blip>
+            <a:stretch>
+              <a:fillRect/>
+            </a:stretch>
+          </p:blipFill>
+          <p:spPr>
+            <a:xfrm>
+              <a:off x="5546977" y="2557328"/>
+              <a:ext cx="3463459" cy="1877195"/>
+            </a:xfrm>
+            <a:prstGeom prst="rect">
+              <a:avLst/>
+            </a:prstGeom>
+          </p:spPr>
+        </p:pic>
+        <p:sp>
+          <p:nvSpPr>
+            <p:cNvPr id="15" name="Rechthoek 14">
+              <a:extLst>
+                <a:ext uri="{FF2B5EF4-FFF2-40B4-BE49-F238E27FC236}">
+                  <a16:creationId xmlns:a16="http://schemas.microsoft.com/office/drawing/2014/main" id="{E42915D5-BA79-46A9-A908-D57DF97E86F8}"/>
+                </a:ext>
+              </a:extLst>
+            </p:cNvPr>
+            <p:cNvSpPr/>
+            <p:nvPr/>
+          </p:nvSpPr>
+          <p:spPr>
+            <a:xfrm>
+              <a:off x="6185043" y="2557329"/>
+              <a:ext cx="1743184" cy="1110546"/>
+            </a:xfrm>
+            <a:prstGeom prst="rect">
+              <a:avLst/>
+            </a:prstGeom>
+          </p:spPr>
+          <p:style>
+            <a:lnRef idx="2">
+              <a:schemeClr val="dk1">
+                <a:shade val="50000"/>
+              </a:schemeClr>
+            </a:lnRef>
+            <a:fillRef idx="1">
+              <a:schemeClr val="dk1"/>
+            </a:fillRef>
+            <a:effectRef idx="0">
+              <a:schemeClr val="dk1"/>
+            </a:effectRef>
+            <a:fontRef idx="minor">
+              <a:schemeClr val="lt1"/>
+            </a:fontRef>
+          </p:style>
+          <p:txBody>
+            <a:bodyPr rtlCol="0" anchor="ctr"/>
+            <a:lstStyle/>
+            <a:p>
+              <a:pPr algn="ctr"/>
+              <a:r>
+                <a:rPr lang="nl-NL" sz="2400" b="1" dirty="0"/>
+                <a:t>Doelwit</a:t>
+              </a:r>
+            </a:p>
+          </p:txBody>
+        </p:sp>
+      </p:grpSp>
+      <p:pic>
+        <p:nvPicPr>
+          <p:cNvPr id="17" name="Afbeelding 16">
+            <a:extLst>
+              <a:ext uri="{FF2B5EF4-FFF2-40B4-BE49-F238E27FC236}">
+                <a16:creationId xmlns:a16="http://schemas.microsoft.com/office/drawing/2014/main" id="{7D0B8662-4BC1-4E5B-91FA-1F844390027C}"/>
+              </a:ext>
+            </a:extLst>
+          </p:cNvPr>
+          <p:cNvPicPr>
+            <a:picLocks noChangeAspect="1"/>
+          </p:cNvPicPr>
+          <p:nvPr/>
+        </p:nvPicPr>
+        <p:blipFill>
+          <a:blip r:embed="rId7">
+            <a:extLst>
+              <a:ext uri="{BEBA8EAE-BF5A-486C-A8C5-ECC9F3942E4B}">
+                <a14:imgProps xmlns:a14="http://schemas.microsoft.com/office/drawing/2010/main">
+                  <a14:imgLayer r:embed="rId8">
+                    <a14:imgEffect>
+                      <a14:backgroundRemoval t="3077" b="97179" l="5450" r="94313">
+                        <a14:foregroundMark x1="12559" y1="24103" x2="6635" y2="10000"/>
+                        <a14:foregroundMark x1="50000" y1="12564" x2="50000" y2="3077"/>
+                        <a14:foregroundMark x1="73697" y1="51538" x2="76540" y2="38462"/>
+                        <a14:foregroundMark x1="76540" y1="38462" x2="94313" y2="9231"/>
+                        <a14:foregroundMark x1="74645" y1="86410" x2="63033" y2="90256"/>
+                        <a14:foregroundMark x1="63033" y1="90256" x2="50474" y2="89744"/>
+                        <a14:foregroundMark x1="50474" y1="89744" x2="38389" y2="92564"/>
+                        <a14:foregroundMark x1="38389" y1="92564" x2="30095" y2="92051"/>
+                        <a14:foregroundMark x1="50711" y1="97179" x2="50711" y2="97179"/>
+                        <a14:foregroundMark x1="50474" y1="97179" x2="48578" y2="96923"/>
+                        <a14:foregroundMark x1="48578" y1="96923" x2="46445" y2="96410"/>
+                      </a14:backgroundRemoval>
+                    </a14:imgEffect>
+                  </a14:imgLayer>
+                </a14:imgProps>
+              </a:ext>
+            </a:extLst>
+          </a:blip>
+          <a:stretch>
+            <a:fillRect/>
+          </a:stretch>
+        </p:blipFill>
+        <p:spPr>
+          <a:xfrm>
+            <a:off x="7213417" y="2174286"/>
+            <a:ext cx="1875652" cy="1733422"/>
+          </a:xfrm>
+          <a:prstGeom prst="rect">
+            <a:avLst/>
+          </a:prstGeom>
+        </p:spPr>
+      </p:pic>
+      <p:pic>
+        <p:nvPicPr>
+          <p:cNvPr id="18" name="Afbeelding 17">
+            <a:extLst>
+              <a:ext uri="{FF2B5EF4-FFF2-40B4-BE49-F238E27FC236}">
+                <a16:creationId xmlns:a16="http://schemas.microsoft.com/office/drawing/2014/main" id="{9567991A-A0CF-48D8-A804-0B8A7FEA6765}"/>
+              </a:ext>
+            </a:extLst>
+          </p:cNvPr>
+          <p:cNvPicPr>
+            <a:picLocks noChangeAspect="1"/>
+          </p:cNvPicPr>
+          <p:nvPr/>
+        </p:nvPicPr>
+        <p:blipFill>
+          <a:blip r:embed="rId9">
+            <a:extLst>
+              <a:ext uri="{BEBA8EAE-BF5A-486C-A8C5-ECC9F3942E4B}">
+                <a14:imgProps xmlns:a14="http://schemas.microsoft.com/office/drawing/2010/main">
+                  <a14:imgLayer r:embed="rId10">
+                    <a14:imgEffect>
+                      <a14:backgroundRemoval t="10000" b="90000" l="10000" r="90000">
+                        <a14:foregroundMark x1="10547" y1="36230" x2="10742" y2="28809"/>
+                        <a14:foregroundMark x1="10742" y1="28809" x2="15625" y2="23242"/>
+                        <a14:foregroundMark x1="15625" y1="23242" x2="21875" y2="19434"/>
+                        <a14:foregroundMark x1="21875" y1="19434" x2="25879" y2="18555"/>
+                        <a14:foregroundMark x1="24512" y1="19629" x2="21191" y2="16016"/>
+                        <a14:foregroundMark x1="25098" y1="18262" x2="25098" y2="17871"/>
+                      </a14:backgroundRemoval>
+                    </a14:imgEffect>
+                  </a14:imgLayer>
+                </a14:imgProps>
+              </a:ext>
+            </a:extLst>
+          </a:blip>
+          <a:stretch>
+            <a:fillRect/>
+          </a:stretch>
+        </p:blipFill>
+        <p:spPr>
+          <a:xfrm>
+            <a:off x="10845436" y="2082436"/>
+            <a:ext cx="2693128" cy="2693128"/>
+          </a:xfrm>
+          <a:prstGeom prst="rect">
+            <a:avLst/>
+          </a:prstGeom>
+        </p:spPr>
+      </p:pic>
+      <p:cxnSp>
+        <p:nvCxnSpPr>
+          <p:cNvPr id="8" name="Rechte verbindingslijn met pijl 7">
+            <a:extLst>
+              <a:ext uri="{FF2B5EF4-FFF2-40B4-BE49-F238E27FC236}">
+                <a16:creationId xmlns:a16="http://schemas.microsoft.com/office/drawing/2014/main" id="{D59D01F2-51A9-4BDE-9711-45D2F22DA41A}"/>
+              </a:ext>
+            </a:extLst>
+          </p:cNvPr>
+          <p:cNvCxnSpPr>
+            <a:endCxn id="18" idx="1"/>
+          </p:cNvCxnSpPr>
+          <p:nvPr/>
+        </p:nvCxnSpPr>
+        <p:spPr>
+          <a:xfrm>
+            <a:off x="9089069" y="3429000"/>
+            <a:ext cx="1756367" cy="0"/>
+          </a:xfrm>
+          <a:prstGeom prst="straightConnector1">
+            <a:avLst/>
+          </a:prstGeom>
+          <a:ln w="76200">
+            <a:solidFill>
+              <a:srgbClr val="0070C0"/>
+            </a:solidFill>
+            <a:headEnd type="triangle"/>
+            <a:tailEnd type="triangle"/>
+          </a:ln>
+        </p:spPr>
+        <p:style>
+          <a:lnRef idx="3">
+            <a:schemeClr val="dk1"/>
+          </a:lnRef>
+          <a:fillRef idx="0">
+            <a:schemeClr val="dk1"/>
+          </a:fillRef>
+          <a:effectRef idx="2">
+            <a:schemeClr val="dk1"/>
+          </a:effectRef>
+          <a:fontRef idx="minor">
+            <a:schemeClr val="tx1"/>
+          </a:fontRef>
+        </p:style>
+      </p:cxnSp>
+      <p:sp>
+        <p:nvSpPr>
+          <p:cNvPr id="26" name="Vrije vorm: vorm 25">
+            <a:extLst>
+              <a:ext uri="{FF2B5EF4-FFF2-40B4-BE49-F238E27FC236}">
+                <a16:creationId xmlns:a16="http://schemas.microsoft.com/office/drawing/2014/main" id="{18F3C64D-A28E-420D-AF14-0FCA32378C1C}"/>
+              </a:ext>
+            </a:extLst>
+          </p:cNvPr>
+          <p:cNvSpPr/>
+          <p:nvPr/>
+        </p:nvSpPr>
+        <p:spPr>
+          <a:xfrm>
+            <a:off x="4098876" y="2174286"/>
+            <a:ext cx="2897312" cy="924674"/>
+          </a:xfrm>
+          <a:custGeom>
+            <a:avLst/>
+            <a:gdLst>
+              <a:gd name="connsiteX0" fmla="*/ 2897312 w 2897312"/>
+              <a:gd name="connsiteY0" fmla="*/ 924674 h 924674"/>
+              <a:gd name="connsiteX1" fmla="*/ 1643865 w 2897312"/>
+              <a:gd name="connsiteY1" fmla="*/ 184935 h 924674"/>
+              <a:gd name="connsiteX2" fmla="*/ 0 w 2897312"/>
+              <a:gd name="connsiteY2" fmla="*/ 0 h 924674"/>
+            </a:gdLst>
+            <a:ahLst/>
+            <a:cxnLst>
+              <a:cxn ang="0">
+                <a:pos x="connsiteX0" y="connsiteY0"/>
+              </a:cxn>
+              <a:cxn ang="0">
+                <a:pos x="connsiteX1" y="connsiteY1"/>
+              </a:cxn>
+              <a:cxn ang="0">
+                <a:pos x="connsiteX2" y="connsiteY2"/>
+              </a:cxn>
+            </a:cxnLst>
+            <a:rect l="l" t="t" r="r" b="b"/>
+            <a:pathLst>
+              <a:path w="2897312" h="924674">
+                <a:moveTo>
+                  <a:pt x="2897312" y="924674"/>
+                </a:moveTo>
+                <a:cubicBezTo>
+                  <a:pt x="2512031" y="631860"/>
+                  <a:pt x="2126750" y="339047"/>
+                  <a:pt x="1643865" y="184935"/>
+                </a:cubicBezTo>
+                <a:cubicBezTo>
+                  <a:pt x="1160980" y="30823"/>
+                  <a:pt x="251717" y="27398"/>
+                  <a:pt x="0" y="0"/>
+                </a:cubicBezTo>
+              </a:path>
+            </a:pathLst>
+          </a:custGeom>
+          <a:noFill/>
+          <a:ln w="28575">
+            <a:solidFill>
+              <a:schemeClr val="tx1"/>
+            </a:solidFill>
+            <a:headEnd type="none" w="med" len="med"/>
+            <a:tailEnd type="arrow" w="med" len="med"/>
+          </a:ln>
+        </p:spPr>
+        <p:style>
+          <a:lnRef idx="2">
+            <a:schemeClr val="accent1">
+              <a:shade val="50000"/>
+            </a:schemeClr>
+          </a:lnRef>
+          <a:fillRef idx="1">
+            <a:schemeClr val="accent1"/>
+          </a:fillRef>
+          <a:effectRef idx="0">
+            <a:schemeClr val="accent1"/>
+          </a:effectRef>
+          <a:fontRef idx="minor">
+            <a:schemeClr val="lt1"/>
+          </a:fontRef>
+        </p:style>
+        <p:txBody>
+          <a:bodyPr rtlCol="0" anchor="ctr"/>
+          <a:lstStyle/>
+          <a:p>
+            <a:pPr algn="ctr"/>
+            <a:endParaRPr lang="nl-NL"/>
+          </a:p>
+        </p:txBody>
+      </p:sp>
+      <p:sp>
+        <p:nvSpPr>
+          <p:cNvPr id="28" name="Vrije vorm: vorm 27">
+            <a:extLst>
+              <a:ext uri="{FF2B5EF4-FFF2-40B4-BE49-F238E27FC236}">
+                <a16:creationId xmlns:a16="http://schemas.microsoft.com/office/drawing/2014/main" id="{68E98539-0C13-47FC-984D-9CB49D9B6EEF}"/>
+              </a:ext>
+            </a:extLst>
+          </p:cNvPr>
+          <p:cNvSpPr/>
+          <p:nvPr/>
+        </p:nvSpPr>
+        <p:spPr>
+          <a:xfrm rot="10800000">
+            <a:off x="4098876" y="2499575"/>
+            <a:ext cx="2897312" cy="924674"/>
+          </a:xfrm>
+          <a:custGeom>
+            <a:avLst/>
+            <a:gdLst>
+              <a:gd name="connsiteX0" fmla="*/ 2897312 w 2897312"/>
+              <a:gd name="connsiteY0" fmla="*/ 924674 h 924674"/>
+              <a:gd name="connsiteX1" fmla="*/ 1643865 w 2897312"/>
+              <a:gd name="connsiteY1" fmla="*/ 184935 h 924674"/>
+              <a:gd name="connsiteX2" fmla="*/ 0 w 2897312"/>
+              <a:gd name="connsiteY2" fmla="*/ 0 h 924674"/>
+              <a:gd name="connsiteX0" fmla="*/ 2897312 w 2897312"/>
+              <a:gd name="connsiteY0" fmla="*/ 924674 h 924674"/>
+              <a:gd name="connsiteX1" fmla="*/ 1613042 w 2897312"/>
+              <a:gd name="connsiteY1" fmla="*/ 297951 h 924674"/>
+              <a:gd name="connsiteX2" fmla="*/ 0 w 2897312"/>
+              <a:gd name="connsiteY2" fmla="*/ 0 h 924674"/>
+            </a:gdLst>
+            <a:ahLst/>
+            <a:cxnLst>
+              <a:cxn ang="0">
+                <a:pos x="connsiteX0" y="connsiteY0"/>
+              </a:cxn>
+              <a:cxn ang="0">
+                <a:pos x="connsiteX1" y="connsiteY1"/>
+              </a:cxn>
+              <a:cxn ang="0">
+                <a:pos x="connsiteX2" y="connsiteY2"/>
+              </a:cxn>
+            </a:cxnLst>
+            <a:rect l="l" t="t" r="r" b="b"/>
+            <a:pathLst>
+              <a:path w="2897312" h="924674">
+                <a:moveTo>
+                  <a:pt x="2897312" y="924674"/>
+                </a:moveTo>
+                <a:cubicBezTo>
+                  <a:pt x="2512031" y="631860"/>
+                  <a:pt x="2095927" y="452063"/>
+                  <a:pt x="1613042" y="297951"/>
+                </a:cubicBezTo>
+                <a:cubicBezTo>
+                  <a:pt x="1130157" y="143839"/>
+                  <a:pt x="251717" y="27398"/>
+                  <a:pt x="0" y="0"/>
+                </a:cubicBezTo>
+              </a:path>
+            </a:pathLst>
+          </a:custGeom>
+          <a:noFill/>
+          <a:ln w="28575">
+            <a:solidFill>
+              <a:schemeClr val="tx1"/>
+            </a:solidFill>
+            <a:headEnd type="none" w="med" len="med"/>
+            <a:tailEnd type="arrow" w="med" len="med"/>
+          </a:ln>
+        </p:spPr>
+        <p:style>
+          <a:lnRef idx="2">
+            <a:schemeClr val="accent1">
+              <a:shade val="50000"/>
+            </a:schemeClr>
+          </a:lnRef>
+          <a:fillRef idx="1">
+            <a:schemeClr val="accent1"/>
+          </a:fillRef>
+          <a:effectRef idx="0">
+            <a:schemeClr val="accent1"/>
+          </a:effectRef>
+          <a:fontRef idx="minor">
+            <a:schemeClr val="lt1"/>
+          </a:fontRef>
+        </p:style>
+        <p:txBody>
+          <a:bodyPr rtlCol="0" anchor="ctr"/>
+          <a:lstStyle/>
+          <a:p>
+            <a:pPr algn="ctr"/>
+            <a:endParaRPr lang="nl-NL"/>
+          </a:p>
+        </p:txBody>
+      </p:sp>
+      <p:sp>
+        <p:nvSpPr>
+          <p:cNvPr id="31" name="Vrije vorm: vorm 30">
+            <a:extLst>
+              <a:ext uri="{FF2B5EF4-FFF2-40B4-BE49-F238E27FC236}">
+                <a16:creationId xmlns:a16="http://schemas.microsoft.com/office/drawing/2014/main" id="{B7B74615-70DA-4A07-9FE4-22D7EB832CDC}"/>
+              </a:ext>
+            </a:extLst>
+          </p:cNvPr>
+          <p:cNvSpPr/>
+          <p:nvPr/>
+        </p:nvSpPr>
+        <p:spPr>
+          <a:xfrm rot="19292124" flipV="1">
+            <a:off x="2163366" y="2950808"/>
+            <a:ext cx="1619079" cy="1570768"/>
+          </a:xfrm>
+          <a:custGeom>
+            <a:avLst/>
+            <a:gdLst>
+              <a:gd name="connsiteX0" fmla="*/ 2897312 w 2897312"/>
+              <a:gd name="connsiteY0" fmla="*/ 924674 h 924674"/>
+              <a:gd name="connsiteX1" fmla="*/ 1643865 w 2897312"/>
+              <a:gd name="connsiteY1" fmla="*/ 184935 h 924674"/>
+              <a:gd name="connsiteX2" fmla="*/ 0 w 2897312"/>
+              <a:gd name="connsiteY2" fmla="*/ 0 h 924674"/>
+              <a:gd name="connsiteX0" fmla="*/ 2897312 w 2897312"/>
+              <a:gd name="connsiteY0" fmla="*/ 924674 h 924674"/>
+              <a:gd name="connsiteX1" fmla="*/ 1869193 w 2897312"/>
+              <a:gd name="connsiteY1" fmla="*/ 353534 h 924674"/>
+              <a:gd name="connsiteX2" fmla="*/ 0 w 2897312"/>
+              <a:gd name="connsiteY2" fmla="*/ 0 h 924674"/>
+              <a:gd name="connsiteX0" fmla="*/ 2727468 w 2727468"/>
+              <a:gd name="connsiteY0" fmla="*/ 881270 h 881270"/>
+              <a:gd name="connsiteX1" fmla="*/ 1699349 w 2727468"/>
+              <a:gd name="connsiteY1" fmla="*/ 310130 h 881270"/>
+              <a:gd name="connsiteX2" fmla="*/ 0 w 2727468"/>
+              <a:gd name="connsiteY2" fmla="*/ 0 h 881270"/>
+            </a:gdLst>
+            <a:ahLst/>
+            <a:cxnLst>
+              <a:cxn ang="0">
+                <a:pos x="connsiteX0" y="connsiteY0"/>
+              </a:cxn>
+              <a:cxn ang="0">
+                <a:pos x="connsiteX1" y="connsiteY1"/>
+              </a:cxn>
+              <a:cxn ang="0">
+                <a:pos x="connsiteX2" y="connsiteY2"/>
+              </a:cxn>
+            </a:cxnLst>
+            <a:rect l="l" t="t" r="r" b="b"/>
+            <a:pathLst>
+              <a:path w="2727468" h="881270">
+                <a:moveTo>
+                  <a:pt x="2727468" y="881270"/>
+                </a:moveTo>
+                <a:cubicBezTo>
+                  <a:pt x="2342187" y="588456"/>
+                  <a:pt x="2153927" y="457008"/>
+                  <a:pt x="1699349" y="310130"/>
+                </a:cubicBezTo>
+                <a:cubicBezTo>
+                  <a:pt x="1244771" y="163252"/>
+                  <a:pt x="251717" y="27398"/>
+                  <a:pt x="0" y="0"/>
+                </a:cubicBezTo>
+              </a:path>
+            </a:pathLst>
+          </a:custGeom>
+          <a:noFill/>
+          <a:ln w="28575">
+            <a:solidFill>
+              <a:schemeClr val="tx1"/>
+            </a:solidFill>
+            <a:headEnd type="none" w="med" len="med"/>
+            <a:tailEnd type="arrow" w="med" len="med"/>
+          </a:ln>
+        </p:spPr>
+        <p:style>
+          <a:lnRef idx="2">
+            <a:schemeClr val="accent1">
+              <a:shade val="50000"/>
+            </a:schemeClr>
+          </a:lnRef>
+          <a:fillRef idx="1">
+            <a:schemeClr val="accent1"/>
+          </a:fillRef>
+          <a:effectRef idx="0">
+            <a:schemeClr val="accent1"/>
+          </a:effectRef>
+          <a:fontRef idx="minor">
+            <a:schemeClr val="lt1"/>
+          </a:fontRef>
+        </p:style>
+        <p:txBody>
+          <a:bodyPr rtlCol="0" anchor="ctr"/>
+          <a:lstStyle/>
+          <a:p>
+            <a:pPr algn="ctr"/>
+            <a:endParaRPr lang="nl-NL"/>
+          </a:p>
+        </p:txBody>
+      </p:sp>
+      <p:sp>
+        <p:nvSpPr>
+          <p:cNvPr id="27" name="Tekstvak 26">
+            <a:extLst>
+              <a:ext uri="{FF2B5EF4-FFF2-40B4-BE49-F238E27FC236}">
+                <a16:creationId xmlns:a16="http://schemas.microsoft.com/office/drawing/2014/main" id="{27175844-C59F-45C6-A1AF-4CB47336CCFE}"/>
+              </a:ext>
+            </a:extLst>
+          </p:cNvPr>
+          <p:cNvSpPr txBox="1"/>
+          <p:nvPr/>
+        </p:nvSpPr>
+        <p:spPr>
+          <a:xfrm rot="1216658">
+            <a:off x="4664254" y="3117271"/>
+            <a:ext cx="1633591" cy="400110"/>
+          </a:xfrm>
+          <a:prstGeom prst="rect">
+            <a:avLst/>
+          </a:prstGeom>
+          <a:noFill/>
+        </p:spPr>
+        <p:txBody>
+          <a:bodyPr wrap="square" rtlCol="0">
+            <a:spAutoFit/>
+          </a:bodyPr>
+          <a:lstStyle/>
+          <a:p>
+            <a:r>
+              <a:rPr lang="nl-NL" sz="2000" b="1" dirty="0">
+                <a:solidFill>
+                  <a:srgbClr val="00B0F0"/>
+                </a:solidFill>
+                <a:effectLst>
+                  <a:outerShdw blurRad="38100" dist="38100" dir="2700000" algn="tl">
+                    <a:srgbClr val="000000">
+                      <a:alpha val="43137"/>
+                    </a:srgbClr>
+                  </a:outerShdw>
+                </a:effectLst>
+              </a:rPr>
+              <a:t>Verzoek</a:t>
+            </a:r>
+          </a:p>
+        </p:txBody>
+      </p:sp>
+      <p:sp>
+        <p:nvSpPr>
+          <p:cNvPr id="33" name="Tekstvak 32">
+            <a:extLst>
+              <a:ext uri="{FF2B5EF4-FFF2-40B4-BE49-F238E27FC236}">
+                <a16:creationId xmlns:a16="http://schemas.microsoft.com/office/drawing/2014/main" id="{D6B27B67-3C7E-43B0-9867-49C38FC1DA6D}"/>
+              </a:ext>
+            </a:extLst>
+          </p:cNvPr>
+          <p:cNvSpPr txBox="1"/>
+          <p:nvPr/>
+        </p:nvSpPr>
+        <p:spPr>
+          <a:xfrm rot="5400000">
+            <a:off x="1005506" y="3723824"/>
+            <a:ext cx="1633591" cy="400110"/>
+          </a:xfrm>
+          <a:prstGeom prst="rect">
+            <a:avLst/>
+          </a:prstGeom>
+          <a:noFill/>
+        </p:spPr>
+        <p:txBody>
+          <a:bodyPr wrap="square" rtlCol="0">
+            <a:spAutoFit/>
+          </a:bodyPr>
+          <a:lstStyle/>
+          <a:p>
+            <a:r>
+              <a:rPr lang="nl-NL" sz="2000" b="1" dirty="0">
+                <a:solidFill>
+                  <a:srgbClr val="00B0F0"/>
+                </a:solidFill>
+                <a:effectLst>
+                  <a:outerShdw blurRad="38100" dist="38100" dir="2700000" algn="tl">
+                    <a:srgbClr val="000000">
+                      <a:alpha val="43137"/>
+                    </a:srgbClr>
+                  </a:outerShdw>
+                </a:effectLst>
+              </a:rPr>
+              <a:t>Verzoek</a:t>
+            </a:r>
+          </a:p>
+        </p:txBody>
+      </p:sp>
+      <p:sp>
+        <p:nvSpPr>
+          <p:cNvPr id="34" name="Tekstvak 33">
+            <a:extLst>
+              <a:ext uri="{FF2B5EF4-FFF2-40B4-BE49-F238E27FC236}">
+                <a16:creationId xmlns:a16="http://schemas.microsoft.com/office/drawing/2014/main" id="{9A830D31-1DA9-46E4-BEA0-02FD1E9E2A3F}"/>
+              </a:ext>
+            </a:extLst>
+          </p:cNvPr>
+          <p:cNvSpPr txBox="1"/>
+          <p:nvPr/>
+        </p:nvSpPr>
+        <p:spPr>
+          <a:xfrm rot="5400000">
+            <a:off x="2680548" y="3635468"/>
+            <a:ext cx="1633591" cy="400110"/>
+          </a:xfrm>
+          <a:prstGeom prst="rect">
+            <a:avLst/>
+          </a:prstGeom>
+          <a:noFill/>
+        </p:spPr>
+        <p:txBody>
+          <a:bodyPr wrap="square" rtlCol="0">
+            <a:spAutoFit/>
+          </a:bodyPr>
+          <a:lstStyle/>
+          <a:p>
+            <a:r>
+              <a:rPr lang="nl-NL" sz="2000" b="1" dirty="0">
+                <a:solidFill>
+                  <a:srgbClr val="FFC000"/>
+                </a:solidFill>
+                <a:effectLst>
+                  <a:outerShdw blurRad="38100" dist="38100" dir="2700000" algn="tl">
+                    <a:srgbClr val="000000">
+                      <a:alpha val="43137"/>
+                    </a:srgbClr>
+                  </a:outerShdw>
+                </a:effectLst>
+              </a:rPr>
+              <a:t>Antwoord</a:t>
+            </a:r>
+          </a:p>
+        </p:txBody>
+      </p:sp>
+      <p:sp>
+        <p:nvSpPr>
+          <p:cNvPr id="35" name="Tekstvak 34">
+            <a:extLst>
+              <a:ext uri="{FF2B5EF4-FFF2-40B4-BE49-F238E27FC236}">
+                <a16:creationId xmlns:a16="http://schemas.microsoft.com/office/drawing/2014/main" id="{951EFBEE-2BCB-484A-B32D-3EEED844577C}"/>
+              </a:ext>
+            </a:extLst>
+          </p:cNvPr>
+          <p:cNvSpPr txBox="1"/>
+          <p:nvPr/>
+        </p:nvSpPr>
+        <p:spPr>
+          <a:xfrm rot="1002512">
+            <a:off x="5108365" y="2035410"/>
+            <a:ext cx="1633591" cy="400110"/>
+          </a:xfrm>
+          <a:prstGeom prst="rect">
+            <a:avLst/>
+          </a:prstGeom>
+          <a:noFill/>
+        </p:spPr>
+        <p:txBody>
+          <a:bodyPr wrap="square" rtlCol="0">
+            <a:spAutoFit/>
+          </a:bodyPr>
+          <a:lstStyle/>
+          <a:p>
+            <a:r>
+              <a:rPr lang="nl-NL" sz="2000" b="1" dirty="0">
+                <a:solidFill>
+                  <a:srgbClr val="FFC000"/>
+                </a:solidFill>
+                <a:effectLst>
+                  <a:outerShdw blurRad="38100" dist="38100" dir="2700000" algn="tl">
+                    <a:srgbClr val="000000">
+                      <a:alpha val="43137"/>
+                    </a:srgbClr>
+                  </a:outerShdw>
+                </a:effectLst>
+              </a:rPr>
+              <a:t>Antwoord</a:t>
+            </a:r>
+          </a:p>
+        </p:txBody>
+      </p:sp>
+      <p:sp>
+        <p:nvSpPr>
+          <p:cNvPr id="3" name="Vrije vorm: vorm 2">
+            <a:extLst>
+              <a:ext uri="{FF2B5EF4-FFF2-40B4-BE49-F238E27FC236}">
+                <a16:creationId xmlns:a16="http://schemas.microsoft.com/office/drawing/2014/main" id="{08760AC4-088A-49DC-8DB8-684C27E24F0D}"/>
+              </a:ext>
+            </a:extLst>
+          </p:cNvPr>
+          <p:cNvSpPr/>
+          <p:nvPr/>
+        </p:nvSpPr>
+        <p:spPr>
+          <a:xfrm>
+            <a:off x="2020099" y="2609636"/>
+            <a:ext cx="342957" cy="2188395"/>
+          </a:xfrm>
+          <a:custGeom>
+            <a:avLst/>
+            <a:gdLst>
+              <a:gd name="connsiteX0" fmla="*/ 188845 w 342957"/>
+              <a:gd name="connsiteY0" fmla="*/ 2188395 h 2188395"/>
+              <a:gd name="connsiteX1" fmla="*/ 3910 w 342957"/>
+              <a:gd name="connsiteY1" fmla="*/ 1047964 h 2188395"/>
+              <a:gd name="connsiteX2" fmla="*/ 342957 w 342957"/>
+              <a:gd name="connsiteY2" fmla="*/ 0 h 2188395"/>
+            </a:gdLst>
+            <a:ahLst/>
+            <a:cxnLst>
+              <a:cxn ang="0">
+                <a:pos x="connsiteX0" y="connsiteY0"/>
+              </a:cxn>
+              <a:cxn ang="0">
+                <a:pos x="connsiteX1" y="connsiteY1"/>
+              </a:cxn>
+              <a:cxn ang="0">
+                <a:pos x="connsiteX2" y="connsiteY2"/>
+              </a:cxn>
+            </a:cxnLst>
+            <a:rect l="l" t="t" r="r" b="b"/>
+            <a:pathLst>
+              <a:path w="342957" h="2188395">
+                <a:moveTo>
+                  <a:pt x="188845" y="2188395"/>
+                </a:moveTo>
+                <a:cubicBezTo>
+                  <a:pt x="83535" y="1800545"/>
+                  <a:pt x="-21775" y="1412696"/>
+                  <a:pt x="3910" y="1047964"/>
+                </a:cubicBezTo>
+                <a:cubicBezTo>
+                  <a:pt x="29595" y="683232"/>
+                  <a:pt x="277887" y="195209"/>
+                  <a:pt x="342957" y="0"/>
+                </a:cubicBezTo>
+              </a:path>
+            </a:pathLst>
+          </a:custGeom>
+          <a:noFill/>
+          <a:ln w="28575">
+            <a:solidFill>
+              <a:schemeClr val="tx1"/>
+            </a:solidFill>
+            <a:headEnd type="none" w="med" len="med"/>
+            <a:tailEnd type="arrow" w="med" len="med"/>
+          </a:ln>
+        </p:spPr>
+        <p:style>
+          <a:lnRef idx="2">
+            <a:schemeClr val="accent1">
+              <a:shade val="50000"/>
+            </a:schemeClr>
+          </a:lnRef>
+          <a:fillRef idx="1">
+            <a:schemeClr val="accent1"/>
+          </a:fillRef>
+          <a:effectRef idx="0">
+            <a:schemeClr val="accent1"/>
+          </a:effectRef>
+          <a:fontRef idx="minor">
+            <a:schemeClr val="lt1"/>
+          </a:fontRef>
+        </p:style>
+        <p:txBody>
+          <a:bodyPr rtlCol="0" anchor="ctr"/>
+          <a:lstStyle/>
+          <a:p>
+            <a:pPr algn="ctr"/>
+            <a:endParaRPr lang="nl-NL"/>
+          </a:p>
+        </p:txBody>
+      </p:sp>
+    </p:spTree>
+    <p:extLst>
+      <p:ext uri="{BB962C8B-B14F-4D97-AF65-F5344CB8AC3E}">
+        <p14:creationId xmlns:p14="http://schemas.microsoft.com/office/powerpoint/2010/main" val="2478428771"/>
+      </p:ext>
+    </p:extLst>
+  </p:cSld>
+  <p:clrMapOvr>
+    <a:masterClrMapping/>
+  </p:clrMapOvr>
+  <p:transition spd="slow">
+    <p:wipe/>
+  </p:transition>
+  <p:timing>
+    <p:tnLst>
+      <p:par>
+        <p:cTn id="1" dur="indefinite" restart="never" nodeType="tmRoot">
+          <p:childTnLst>
+            <p:seq concurrent="1" nextAc="seek">
+              <p:cTn id="2" dur="indefinite" nodeType="mainSeq">
+                <p:childTnLst>
+                  <p:par>
+                    <p:cTn id="3" fill="hold">
+                      <p:stCondLst>
+                        <p:cond delay="indefinite"/>
+                      </p:stCondLst>
+                      <p:childTnLst>
+                        <p:par>
+                          <p:cTn id="4" fill="hold">
+                            <p:stCondLst>
+                              <p:cond delay="0"/>
+                            </p:stCondLst>
+                            <p:childTnLst>
+                              <p:par>
+                                <p:cTn id="5" presetID="10" presetClass="entr" presetSubtype="0" fill="hold" grpId="0" nodeType="clickEffect">
+                                  <p:stCondLst>
+                                    <p:cond delay="0"/>
+                                  </p:stCondLst>
+                                  <p:childTnLst>
+                                    <p:set>
+                                      <p:cBhvr>
+                                        <p:cTn id="6" dur="1" fill="hold">
+                                          <p:stCondLst>
+                                            <p:cond delay="0"/>
+                                          </p:stCondLst>
+                                        </p:cTn>
+                                        <p:tgtEl>
+                                          <p:spTgt spid="2"/>
+                                        </p:tgtEl>
+                                        <p:attrNameLst>
+                                          <p:attrName>style.visibility</p:attrName>
+                                        </p:attrNameLst>
+                                      </p:cBhvr>
+                                      <p:to>
+                                        <p:strVal val="visible"/>
+                                      </p:to>
+                                    </p:set>
+                                    <p:animEffect transition="in" filter="fade">
+                                      <p:cBhvr>
+                                        <p:cTn id="7" dur="500"/>
+                                        <p:tgtEl>
+                                          <p:spTgt spid="2"/>
+                                        </p:tgtEl>
+                                      </p:cBhvr>
+                                    </p:animEffect>
+                                  </p:childTnLst>
+                                </p:cTn>
+                              </p:par>
+                              <p:par>
+                                <p:cTn id="8" presetID="24" presetClass="emph" presetSubtype="0" fill="hold" grpId="1" nodeType="withEffect">
+                                  <p:stCondLst>
+                                    <p:cond delay="0"/>
+                                  </p:stCondLst>
+                                  <p:childTnLst>
+                                    <p:animClr clrSpc="hsl" dir="cw">
+                                      <p:cBhvr override="childStyle">
+                                        <p:cTn id="9" dur="1000" fill="hold"/>
+                                        <p:tgtEl>
+                                          <p:spTgt spid="2"/>
+                                        </p:tgtEl>
+                                        <p:attrNameLst>
+                                          <p:attrName>style.color</p:attrName>
+                                        </p:attrNameLst>
+                                      </p:cBhvr>
+                                      <p:by>
+                                        <p:hsl h="0" s="-12549" l="-25098"/>
+                                      </p:by>
+                                    </p:animClr>
+                                    <p:animClr clrSpc="hsl" dir="cw">
+                                      <p:cBhvr>
+                                        <p:cTn id="10" dur="1000" fill="hold"/>
+                                        <p:tgtEl>
+                                          <p:spTgt spid="2"/>
+                                        </p:tgtEl>
+                                        <p:attrNameLst>
+                                          <p:attrName>fillcolor</p:attrName>
+                                        </p:attrNameLst>
+                                      </p:cBhvr>
+                                      <p:by>
+                                        <p:hsl h="0" s="-12549" l="-25098"/>
+                                      </p:by>
+                                    </p:animClr>
+                                    <p:animClr clrSpc="hsl" dir="cw">
+                                      <p:cBhvr>
+                                        <p:cTn id="11" dur="1000" fill="hold"/>
+                                        <p:tgtEl>
+                                          <p:spTgt spid="2"/>
+                                        </p:tgtEl>
+                                        <p:attrNameLst>
+                                          <p:attrName>stroke.color</p:attrName>
+                                        </p:attrNameLst>
+                                      </p:cBhvr>
+                                      <p:by>
+                                        <p:hsl h="0" s="-12549" l="-25098"/>
+                                      </p:by>
+                                    </p:animClr>
+                                    <p:set>
+                                      <p:cBhvr>
+                                        <p:cTn id="12" dur="1000" fill="hold"/>
+                                        <p:tgtEl>
+                                          <p:spTgt spid="2"/>
+                                        </p:tgtEl>
+                                        <p:attrNameLst>
+                                          <p:attrName>fill.type</p:attrName>
+                                        </p:attrNameLst>
+                                      </p:cBhvr>
+                                      <p:to>
+                                        <p:strVal val="solid"/>
+                                      </p:to>
+                                    </p:set>
+                                  </p:childTnLst>
+                                  <p:subTnLst>
+                                    <p:animClr clrSpc="rgb" dir="cw">
+                                      <p:cBhvr override="childStyle">
+                                        <p:cTn dur="1" fill="hold" display="0" masterRel="nextClick" afterEffect="1"/>
+                                        <p:tgtEl>
+                                          <p:spTgt spid="2"/>
+                                        </p:tgtEl>
+                                        <p:attrNameLst>
+                                          <p:attrName>ppt_c</p:attrName>
+                                        </p:attrNameLst>
+                                      </p:cBhvr>
+                                      <p:to>
+                                        <a:schemeClr val="folHlink"/>
+                                      </p:to>
+                                    </p:animClr>
+                                  </p:subTnLst>
+                                </p:cTn>
+                              </p:par>
+                              <p:par>
+                                <p:cTn id="13" presetID="10" presetClass="entr" presetSubtype="0" fill="hold" nodeType="withEffect">
+                                  <p:stCondLst>
+                                    <p:cond delay="0"/>
+                                  </p:stCondLst>
+                                  <p:childTnLst>
+                                    <p:set>
+                                      <p:cBhvr>
+                                        <p:cTn id="14" dur="1" fill="hold">
+                                          <p:stCondLst>
+                                            <p:cond delay="0"/>
+                                          </p:stCondLst>
+                                        </p:cTn>
+                                        <p:tgtEl>
+                                          <p:spTgt spid="17"/>
+                                        </p:tgtEl>
+                                        <p:attrNameLst>
+                                          <p:attrName>style.visibility</p:attrName>
+                                        </p:attrNameLst>
+                                      </p:cBhvr>
+                                      <p:to>
+                                        <p:strVal val="visible"/>
+                                      </p:to>
+                                    </p:set>
+                                    <p:animEffect transition="in" filter="fade">
+                                      <p:cBhvr>
+                                        <p:cTn id="15" dur="500"/>
+                                        <p:tgtEl>
+                                          <p:spTgt spid="17"/>
+                                        </p:tgtEl>
+                                      </p:cBhvr>
+                                    </p:animEffect>
+                                  </p:childTnLst>
+                                </p:cTn>
+                              </p:par>
+                              <p:par>
+                                <p:cTn id="16" presetID="10" presetClass="entr" presetSubtype="0" fill="hold" nodeType="withEffect">
+                                  <p:stCondLst>
+                                    <p:cond delay="0"/>
+                                  </p:stCondLst>
+                                  <p:childTnLst>
+                                    <p:set>
+                                      <p:cBhvr>
+                                        <p:cTn id="17" dur="1" fill="hold">
+                                          <p:stCondLst>
+                                            <p:cond delay="0"/>
+                                          </p:stCondLst>
+                                        </p:cTn>
+                                        <p:tgtEl>
+                                          <p:spTgt spid="13"/>
+                                        </p:tgtEl>
+                                        <p:attrNameLst>
+                                          <p:attrName>style.visibility</p:attrName>
+                                        </p:attrNameLst>
+                                      </p:cBhvr>
+                                      <p:to>
+                                        <p:strVal val="visible"/>
+                                      </p:to>
+                                    </p:set>
+                                    <p:animEffect transition="in" filter="fade">
+                                      <p:cBhvr>
+                                        <p:cTn id="18" dur="500"/>
+                                        <p:tgtEl>
+                                          <p:spTgt spid="13"/>
+                                        </p:tgtEl>
+                                      </p:cBhvr>
+                                    </p:animEffect>
+                                  </p:childTnLst>
+                                </p:cTn>
+                              </p:par>
+                              <p:par>
+                                <p:cTn id="19" presetID="10" presetClass="entr" presetSubtype="0" fill="hold" nodeType="withEffect">
+                                  <p:stCondLst>
+                                    <p:cond delay="0"/>
+                                  </p:stCondLst>
+                                  <p:childTnLst>
+                                    <p:set>
+                                      <p:cBhvr>
+                                        <p:cTn id="20" dur="1" fill="hold">
+                                          <p:stCondLst>
+                                            <p:cond delay="0"/>
+                                          </p:stCondLst>
+                                        </p:cTn>
+                                        <p:tgtEl>
+                                          <p:spTgt spid="16"/>
+                                        </p:tgtEl>
+                                        <p:attrNameLst>
+                                          <p:attrName>style.visibility</p:attrName>
+                                        </p:attrNameLst>
+                                      </p:cBhvr>
+                                      <p:to>
+                                        <p:strVal val="visible"/>
+                                      </p:to>
+                                    </p:set>
+                                    <p:animEffect transition="in" filter="fade">
+                                      <p:cBhvr>
+                                        <p:cTn id="21" dur="500"/>
+                                        <p:tgtEl>
+                                          <p:spTgt spid="16"/>
+                                        </p:tgtEl>
+                                      </p:cBhvr>
+                                    </p:animEffect>
+                                  </p:childTnLst>
+                                </p:cTn>
+                              </p:par>
+                              <p:par>
+                                <p:cTn id="22" presetID="10" presetClass="entr" presetSubtype="0" fill="hold" nodeType="withEffect">
+                                  <p:stCondLst>
+                                    <p:cond delay="0"/>
+                                  </p:stCondLst>
+                                  <p:childTnLst>
+                                    <p:set>
+                                      <p:cBhvr>
+                                        <p:cTn id="23" dur="1" fill="hold">
+                                          <p:stCondLst>
+                                            <p:cond delay="0"/>
+                                          </p:stCondLst>
+                                        </p:cTn>
+                                        <p:tgtEl>
+                                          <p:spTgt spid="18"/>
+                                        </p:tgtEl>
+                                        <p:attrNameLst>
+                                          <p:attrName>style.visibility</p:attrName>
+                                        </p:attrNameLst>
+                                      </p:cBhvr>
+                                      <p:to>
+                                        <p:strVal val="visible"/>
+                                      </p:to>
+                                    </p:set>
+                                    <p:animEffect transition="in" filter="fade">
+                                      <p:cBhvr>
+                                        <p:cTn id="24" dur="500"/>
+                                        <p:tgtEl>
+                                          <p:spTgt spid="18"/>
+                                        </p:tgtEl>
+                                      </p:cBhvr>
+                                    </p:animEffect>
+                                  </p:childTnLst>
+                                </p:cTn>
+                              </p:par>
+                              <p:par>
+                                <p:cTn id="25" presetID="10" presetClass="entr" presetSubtype="0" fill="hold" nodeType="withEffect">
+                                  <p:stCondLst>
+                                    <p:cond delay="0"/>
+                                  </p:stCondLst>
+                                  <p:childTnLst>
+                                    <p:set>
+                                      <p:cBhvr>
+                                        <p:cTn id="26" dur="1" fill="hold">
+                                          <p:stCondLst>
+                                            <p:cond delay="0"/>
+                                          </p:stCondLst>
+                                        </p:cTn>
+                                        <p:tgtEl>
+                                          <p:spTgt spid="8"/>
+                                        </p:tgtEl>
+                                        <p:attrNameLst>
+                                          <p:attrName>style.visibility</p:attrName>
+                                        </p:attrNameLst>
+                                      </p:cBhvr>
+                                      <p:to>
+                                        <p:strVal val="visible"/>
+                                      </p:to>
+                                    </p:set>
+                                    <p:animEffect transition="in" filter="fade">
+                                      <p:cBhvr>
+                                        <p:cTn id="27" dur="500"/>
+                                        <p:tgtEl>
+                                          <p:spTgt spid="8"/>
+                                        </p:tgtEl>
+                                      </p:cBhvr>
+                                    </p:animEffect>
+                                  </p:childTnLst>
+                                </p:cTn>
+                              </p:par>
+                            </p:childTnLst>
+                          </p:cTn>
+                        </p:par>
+                      </p:childTnLst>
+                    </p:cTn>
+                  </p:par>
+                  <p:par>
+                    <p:cTn id="28" fill="hold">
+                      <p:stCondLst>
+                        <p:cond delay="indefinite"/>
+                      </p:stCondLst>
+                      <p:childTnLst>
+                        <p:par>
+                          <p:cTn id="29" fill="hold">
+                            <p:stCondLst>
+                              <p:cond delay="0"/>
+                            </p:stCondLst>
+                            <p:childTnLst>
+                              <p:par>
+                                <p:cTn id="30" presetID="10" presetClass="entr" presetSubtype="0" fill="hold" grpId="0" nodeType="clickEffect">
+                                  <p:stCondLst>
+                                    <p:cond delay="0"/>
+                                  </p:stCondLst>
+                                  <p:childTnLst>
+                                    <p:set>
+                                      <p:cBhvr>
+                                        <p:cTn id="31" dur="1" fill="hold">
+                                          <p:stCondLst>
+                                            <p:cond delay="0"/>
+                                          </p:stCondLst>
+                                        </p:cTn>
+                                        <p:tgtEl>
+                                          <p:spTgt spid="3"/>
+                                        </p:tgtEl>
+                                        <p:attrNameLst>
+                                          <p:attrName>style.visibility</p:attrName>
+                                        </p:attrNameLst>
+                                      </p:cBhvr>
+                                      <p:to>
+                                        <p:strVal val="visible"/>
+                                      </p:to>
+                                    </p:set>
+                                    <p:animEffect transition="in" filter="fade">
+                                      <p:cBhvr>
+                                        <p:cTn id="32" dur="500"/>
+                                        <p:tgtEl>
+                                          <p:spTgt spid="3"/>
+                                        </p:tgtEl>
+                                      </p:cBhvr>
+                                    </p:animEffect>
+                                  </p:childTnLst>
+                                </p:cTn>
+                              </p:par>
+                              <p:par>
+                                <p:cTn id="33" presetID="10" presetClass="entr" presetSubtype="0" fill="hold" grpId="0" nodeType="withEffect">
+                                  <p:stCondLst>
+                                    <p:cond delay="0"/>
+                                  </p:stCondLst>
+                                  <p:childTnLst>
+                                    <p:set>
+                                      <p:cBhvr>
+                                        <p:cTn id="34" dur="1" fill="hold">
+                                          <p:stCondLst>
+                                            <p:cond delay="0"/>
+                                          </p:stCondLst>
+                                        </p:cTn>
+                                        <p:tgtEl>
+                                          <p:spTgt spid="33"/>
+                                        </p:tgtEl>
+                                        <p:attrNameLst>
+                                          <p:attrName>style.visibility</p:attrName>
+                                        </p:attrNameLst>
+                                      </p:cBhvr>
+                                      <p:to>
+                                        <p:strVal val="visible"/>
+                                      </p:to>
+                                    </p:set>
+                                    <p:animEffect transition="in" filter="fade">
+                                      <p:cBhvr>
+                                        <p:cTn id="35" dur="500"/>
+                                        <p:tgtEl>
+                                          <p:spTgt spid="33"/>
+                                        </p:tgtEl>
+                                      </p:cBhvr>
+                                    </p:animEffect>
+                                  </p:childTnLst>
+                                </p:cTn>
+                              </p:par>
+                            </p:childTnLst>
+                          </p:cTn>
+                        </p:par>
+                      </p:childTnLst>
+                    </p:cTn>
+                  </p:par>
+                  <p:par>
+                    <p:cTn id="36" fill="hold">
+                      <p:stCondLst>
+                        <p:cond delay="indefinite"/>
+                      </p:stCondLst>
+                      <p:childTnLst>
+                        <p:par>
+                          <p:cTn id="37" fill="hold">
+                            <p:stCondLst>
+                              <p:cond delay="0"/>
+                            </p:stCondLst>
+                            <p:childTnLst>
+                              <p:par>
+                                <p:cTn id="38" presetID="10" presetClass="entr" presetSubtype="0" fill="hold" grpId="0" nodeType="clickEffect">
+                                  <p:stCondLst>
+                                    <p:cond delay="0"/>
+                                  </p:stCondLst>
+                                  <p:childTnLst>
+                                    <p:set>
+                                      <p:cBhvr>
+                                        <p:cTn id="39" dur="1" fill="hold">
+                                          <p:stCondLst>
+                                            <p:cond delay="0"/>
+                                          </p:stCondLst>
+                                        </p:cTn>
+                                        <p:tgtEl>
+                                          <p:spTgt spid="27"/>
+                                        </p:tgtEl>
+                                        <p:attrNameLst>
+                                          <p:attrName>style.visibility</p:attrName>
+                                        </p:attrNameLst>
+                                      </p:cBhvr>
+                                      <p:to>
+                                        <p:strVal val="visible"/>
+                                      </p:to>
+                                    </p:set>
+                                    <p:animEffect transition="in" filter="fade">
+                                      <p:cBhvr>
+                                        <p:cTn id="40" dur="500"/>
+                                        <p:tgtEl>
+                                          <p:spTgt spid="27"/>
+                                        </p:tgtEl>
+                                      </p:cBhvr>
+                                    </p:animEffect>
+                                  </p:childTnLst>
+                                </p:cTn>
+                              </p:par>
+                              <p:par>
+                                <p:cTn id="41" presetID="10" presetClass="entr" presetSubtype="0" fill="hold" grpId="0" nodeType="withEffect">
+                                  <p:stCondLst>
+                                    <p:cond delay="0"/>
+                                  </p:stCondLst>
+                                  <p:childTnLst>
+                                    <p:set>
+                                      <p:cBhvr>
+                                        <p:cTn id="42" dur="1" fill="hold">
+                                          <p:stCondLst>
+                                            <p:cond delay="0"/>
+                                          </p:stCondLst>
+                                        </p:cTn>
+                                        <p:tgtEl>
+                                          <p:spTgt spid="28"/>
+                                        </p:tgtEl>
+                                        <p:attrNameLst>
+                                          <p:attrName>style.visibility</p:attrName>
+                                        </p:attrNameLst>
+                                      </p:cBhvr>
+                                      <p:to>
+                                        <p:strVal val="visible"/>
+                                      </p:to>
+                                    </p:set>
+                                    <p:animEffect transition="in" filter="fade">
+                                      <p:cBhvr>
+                                        <p:cTn id="43" dur="500"/>
+                                        <p:tgtEl>
+                                          <p:spTgt spid="28"/>
+                                        </p:tgtEl>
+                                      </p:cBhvr>
+                                    </p:animEffect>
+                                  </p:childTnLst>
+                                </p:cTn>
+                              </p:par>
+                            </p:childTnLst>
+                          </p:cTn>
+                        </p:par>
+                      </p:childTnLst>
+                    </p:cTn>
+                  </p:par>
+                  <p:par>
+                    <p:cTn id="44" fill="hold">
+                      <p:stCondLst>
+                        <p:cond delay="indefinite"/>
+                      </p:stCondLst>
+                      <p:childTnLst>
+                        <p:par>
+                          <p:cTn id="45" fill="hold">
+                            <p:stCondLst>
+                              <p:cond delay="0"/>
+                            </p:stCondLst>
+                            <p:childTnLst>
+                              <p:par>
+                                <p:cTn id="46" presetID="10" presetClass="entr" presetSubtype="0" fill="hold" grpId="0" nodeType="clickEffect">
+                                  <p:stCondLst>
+                                    <p:cond delay="0"/>
+                                  </p:stCondLst>
+                                  <p:childTnLst>
+                                    <p:set>
+                                      <p:cBhvr>
+                                        <p:cTn id="47" dur="1" fill="hold">
+                                          <p:stCondLst>
+                                            <p:cond delay="0"/>
+                                          </p:stCondLst>
+                                        </p:cTn>
+                                        <p:tgtEl>
+                                          <p:spTgt spid="26"/>
+                                        </p:tgtEl>
+                                        <p:attrNameLst>
+                                          <p:attrName>style.visibility</p:attrName>
+                                        </p:attrNameLst>
+                                      </p:cBhvr>
+                                      <p:to>
+                                        <p:strVal val="visible"/>
+                                      </p:to>
+                                    </p:set>
+                                    <p:animEffect transition="in" filter="fade">
+                                      <p:cBhvr>
+                                        <p:cTn id="48" dur="500"/>
+                                        <p:tgtEl>
+                                          <p:spTgt spid="26"/>
+                                        </p:tgtEl>
+                                      </p:cBhvr>
+                                    </p:animEffect>
+                                  </p:childTnLst>
+                                </p:cTn>
+                              </p:par>
+                              <p:par>
+                                <p:cTn id="49" presetID="10" presetClass="entr" presetSubtype="0" fill="hold" grpId="0" nodeType="withEffect">
+                                  <p:stCondLst>
+                                    <p:cond delay="0"/>
+                                  </p:stCondLst>
+                                  <p:childTnLst>
+                                    <p:set>
+                                      <p:cBhvr>
+                                        <p:cTn id="50" dur="1" fill="hold">
+                                          <p:stCondLst>
+                                            <p:cond delay="0"/>
+                                          </p:stCondLst>
+                                        </p:cTn>
+                                        <p:tgtEl>
+                                          <p:spTgt spid="35"/>
+                                        </p:tgtEl>
+                                        <p:attrNameLst>
+                                          <p:attrName>style.visibility</p:attrName>
+                                        </p:attrNameLst>
+                                      </p:cBhvr>
+                                      <p:to>
+                                        <p:strVal val="visible"/>
+                                      </p:to>
+                                    </p:set>
+                                    <p:animEffect transition="in" filter="fade">
+                                      <p:cBhvr>
+                                        <p:cTn id="51" dur="500"/>
+                                        <p:tgtEl>
+                                          <p:spTgt spid="35"/>
+                                        </p:tgtEl>
+                                      </p:cBhvr>
+                                    </p:animEffect>
+                                  </p:childTnLst>
+                                </p:cTn>
+                              </p:par>
+                            </p:childTnLst>
+                          </p:cTn>
+                        </p:par>
+                      </p:childTnLst>
+                    </p:cTn>
+                  </p:par>
+                  <p:par>
+                    <p:cTn id="52" fill="hold">
+                      <p:stCondLst>
+                        <p:cond delay="indefinite"/>
+                      </p:stCondLst>
+                      <p:childTnLst>
+                        <p:par>
+                          <p:cTn id="53" fill="hold">
+                            <p:stCondLst>
+                              <p:cond delay="0"/>
+                            </p:stCondLst>
+                            <p:childTnLst>
+                              <p:par>
+                                <p:cTn id="54" presetID="10" presetClass="entr" presetSubtype="0" fill="hold" grpId="0" nodeType="clickEffect">
+                                  <p:stCondLst>
+                                    <p:cond delay="0"/>
+                                  </p:stCondLst>
+                                  <p:childTnLst>
+                                    <p:set>
+                                      <p:cBhvr>
+                                        <p:cTn id="55" dur="1" fill="hold">
+                                          <p:stCondLst>
+                                            <p:cond delay="0"/>
+                                          </p:stCondLst>
+                                        </p:cTn>
+                                        <p:tgtEl>
+                                          <p:spTgt spid="31"/>
+                                        </p:tgtEl>
+                                        <p:attrNameLst>
+                                          <p:attrName>style.visibility</p:attrName>
+                                        </p:attrNameLst>
+                                      </p:cBhvr>
+                                      <p:to>
+                                        <p:strVal val="visible"/>
+                                      </p:to>
+                                    </p:set>
+                                    <p:animEffect transition="in" filter="fade">
+                                      <p:cBhvr>
+                                        <p:cTn id="56" dur="500"/>
+                                        <p:tgtEl>
+                                          <p:spTgt spid="31"/>
+                                        </p:tgtEl>
+                                      </p:cBhvr>
+                                    </p:animEffect>
+                                  </p:childTnLst>
+                                </p:cTn>
+                              </p:par>
+                              <p:par>
+                                <p:cTn id="57" presetID="10" presetClass="entr" presetSubtype="0" fill="hold" grpId="0" nodeType="withEffect">
+                                  <p:stCondLst>
+                                    <p:cond delay="0"/>
+                                  </p:stCondLst>
+                                  <p:childTnLst>
+                                    <p:set>
+                                      <p:cBhvr>
+                                        <p:cTn id="58" dur="1" fill="hold">
+                                          <p:stCondLst>
+                                            <p:cond delay="0"/>
+                                          </p:stCondLst>
+                                        </p:cTn>
+                                        <p:tgtEl>
+                                          <p:spTgt spid="34"/>
+                                        </p:tgtEl>
+                                        <p:attrNameLst>
+                                          <p:attrName>style.visibility</p:attrName>
+                                        </p:attrNameLst>
+                                      </p:cBhvr>
+                                      <p:to>
+                                        <p:strVal val="visible"/>
+                                      </p:to>
+                                    </p:set>
+                                    <p:animEffect transition="in" filter="fade">
+                                      <p:cBhvr>
+                                        <p:cTn id="59" dur="500"/>
+                                        <p:tgtEl>
+                                          <p:spTgt spid="34"/>
+                                        </p:tgtEl>
+                                      </p:cBhvr>
+                                    </p:animEffect>
+                                  </p:childTnLst>
+                                </p:cTn>
+                              </p:par>
+                            </p:childTnLst>
+                          </p:cTn>
+                        </p:par>
+                      </p:childTnLst>
+                    </p:cTn>
+                  </p:par>
+                </p:childTnLst>
+              </p:cTn>
+              <p:prevCondLst>
+                <p:cond evt="onPrev" delay="0">
+                  <p:tgtEl>
+                    <p:sldTgt/>
+                  </p:tgtEl>
+                </p:cond>
+              </p:prevCondLst>
+              <p:nextCondLst>
+                <p:cond evt="onNext" delay="0">
+                  <p:tgtEl>
+                    <p:sldTgt/>
+                  </p:tgtEl>
+                </p:cond>
+              </p:nextCondLst>
+            </p:seq>
+          </p:childTnLst>
+        </p:cTn>
+      </p:par>
+    </p:tnLst>
+    <p:bldLst>
+      <p:bldP spid="2" grpId="0"/>
+      <p:bldP spid="2" grpId="1"/>
+      <p:bldP spid="26" grpId="0" animBg="1"/>
+      <p:bldP spid="28" grpId="0" animBg="1"/>
+      <p:bldP spid="31" grpId="0" animBg="1"/>
+      <p:bldP spid="27" grpId="0"/>
+      <p:bldP spid="33" grpId="0"/>
+      <p:bldP spid="34" grpId="0"/>
+      <p:bldP spid="35" grpId="0"/>
+      <p:bldP spid="3" grpId="0" animBg="1"/>
+    </p:bldLst>
+  </p:timing>
+</p:sld>
+</file>
+
+<file path=ppt/slides/slide11.xml><?xml version="1.0" encoding="utf-8"?>
 <p:sld xmlns:a="http://schemas.openxmlformats.org/drawingml/2006/main" xmlns:r="http://schemas.openxmlformats.org/officeDocument/2006/relationships" xmlns:p="http://schemas.openxmlformats.org/presentationml/2006/main">
   <p:cSld>
     <p:spTree>
@@ -8183,7 +9962,7 @@
 </p:sld>
 </file>
 
-<file path=ppt/slides/slide11.xml><?xml version="1.0" encoding="utf-8"?>
+<file path=ppt/slides/slide12.xml><?xml version="1.0" encoding="utf-8"?>
 <p:sld xmlns:a="http://schemas.openxmlformats.org/drawingml/2006/main" xmlns:r="http://schemas.openxmlformats.org/officeDocument/2006/relationships" xmlns:p="http://schemas.openxmlformats.org/presentationml/2006/main">
   <p:cSld>
     <p:spTree>
@@ -9355,7 +11134,7 @@
 </p:sld>
 </file>
 
-<file path=ppt/slides/slide12.xml><?xml version="1.0" encoding="utf-8"?>
+<file path=ppt/slides/slide13.xml><?xml version="1.0" encoding="utf-8"?>
 <p:sld xmlns:a="http://schemas.openxmlformats.org/drawingml/2006/main" xmlns:r="http://schemas.openxmlformats.org/officeDocument/2006/relationships" xmlns:p="http://schemas.openxmlformats.org/presentationml/2006/main">
   <p:cSld>
     <p:spTree>
@@ -10870,6 +12649,90 @@
       </p:grpSpPr>
       <p:sp>
         <p:nvSpPr>
+          <p:cNvPr id="2" name="Titel 1">
+            <a:extLst>
+              <a:ext uri="{FF2B5EF4-FFF2-40B4-BE49-F238E27FC236}">
+                <a16:creationId xmlns:a16="http://schemas.microsoft.com/office/drawing/2014/main" id="{5FD6672A-C938-48C3-A9BA-953500E8744E}"/>
+              </a:ext>
+            </a:extLst>
+          </p:cNvPr>
+          <p:cNvSpPr>
+            <a:spLocks noGrp="1"/>
+          </p:cNvSpPr>
+          <p:nvPr>
+            <p:ph type="title"/>
+          </p:nvPr>
+        </p:nvSpPr>
+        <p:spPr/>
+        <p:txBody>
+          <a:bodyPr/>
+          <a:lstStyle/>
+          <a:p>
+            <a:r>
+              <a:rPr lang="nl-NL" dirty="0" err="1"/>
+              <a:t>Itissues</a:t>
+            </a:r>
+            <a:endParaRPr lang="nl-NL" dirty="0"/>
+          </a:p>
+        </p:txBody>
+      </p:sp>
+      <p:sp>
+        <p:nvSpPr>
+          <p:cNvPr id="3" name="Tijdelijke aanduiding voor inhoud 2">
+            <a:extLst>
+              <a:ext uri="{FF2B5EF4-FFF2-40B4-BE49-F238E27FC236}">
+                <a16:creationId xmlns:a16="http://schemas.microsoft.com/office/drawing/2014/main" id="{8F347ADC-AF28-48AE-9283-323690C6FF9B}"/>
+              </a:ext>
+            </a:extLst>
+          </p:cNvPr>
+          <p:cNvSpPr>
+            <a:spLocks noGrp="1"/>
+          </p:cNvSpPr>
+          <p:nvPr>
+            <p:ph idx="1"/>
+          </p:nvPr>
+        </p:nvSpPr>
+        <p:spPr/>
+        <p:txBody>
+          <a:bodyPr/>
+          <a:lstStyle/>
+          <a:p>
+            <a:endParaRPr lang="nl-NL"/>
+          </a:p>
+        </p:txBody>
+      </p:sp>
+    </p:spTree>
+    <p:extLst>
+      <p:ext uri="{BB962C8B-B14F-4D97-AF65-F5344CB8AC3E}">
+        <p14:creationId xmlns:p14="http://schemas.microsoft.com/office/powerpoint/2010/main" val="1624732826"/>
+      </p:ext>
+    </p:extLst>
+  </p:cSld>
+  <p:clrMapOvr>
+    <a:masterClrMapping/>
+  </p:clrMapOvr>
+</p:sld>
+</file>
+
+<file path=ppt/slides/slide3.xml><?xml version="1.0" encoding="utf-8"?>
+<p:sld xmlns:a="http://schemas.openxmlformats.org/drawingml/2006/main" xmlns:r="http://schemas.openxmlformats.org/officeDocument/2006/relationships" xmlns:p="http://schemas.openxmlformats.org/presentationml/2006/main">
+  <p:cSld>
+    <p:spTree>
+      <p:nvGrpSpPr>
+        <p:cNvPr id="1" name=""/>
+        <p:cNvGrpSpPr/>
+        <p:nvPr/>
+      </p:nvGrpSpPr>
+      <p:grpSpPr>
+        <a:xfrm>
+          <a:off x="0" y="0"/>
+          <a:ext cx="0" cy="0"/>
+          <a:chOff x="0" y="0"/>
+          <a:chExt cx="0" cy="0"/>
+        </a:xfrm>
+      </p:grpSpPr>
+      <p:sp>
+        <p:nvSpPr>
           <p:cNvPr id="2" name="Titel 1"/>
           <p:cNvSpPr>
             <a:spLocks noGrp="1"/>
@@ -12146,7 +14009,7 @@
 </p:sld>
 </file>
 
-<file path=ppt/slides/slide3.xml><?xml version="1.0" encoding="utf-8"?>
+<file path=ppt/slides/slide4.xml><?xml version="1.0" encoding="utf-8"?>
 <p:sld xmlns:a="http://schemas.openxmlformats.org/drawingml/2006/main" xmlns:r="http://schemas.openxmlformats.org/officeDocument/2006/relationships" xmlns:p="http://schemas.openxmlformats.org/presentationml/2006/main">
   <p:cSld>
     <p:spTree>
@@ -13020,7 +14883,7 @@
 </p:sld>
 </file>
 
-<file path=ppt/slides/slide4.xml><?xml version="1.0" encoding="utf-8"?>
+<file path=ppt/slides/slide5.xml><?xml version="1.0" encoding="utf-8"?>
 <p:sld xmlns:a="http://schemas.openxmlformats.org/drawingml/2006/main" xmlns:r="http://schemas.openxmlformats.org/officeDocument/2006/relationships" xmlns:p="http://schemas.openxmlformats.org/presentationml/2006/main">
   <p:cSld>
     <p:spTree>
@@ -13910,7 +15773,7 @@
 </p:sld>
 </file>
 
-<file path=ppt/slides/slide5.xml><?xml version="1.0" encoding="utf-8"?>
+<file path=ppt/slides/slide6.xml><?xml version="1.0" encoding="utf-8"?>
 <p:sld xmlns:a="http://schemas.openxmlformats.org/drawingml/2006/main" xmlns:r="http://schemas.openxmlformats.org/officeDocument/2006/relationships" xmlns:p="http://schemas.openxmlformats.org/presentationml/2006/main">
   <p:cSld>
     <p:spTree>
@@ -15672,7 +17535,7 @@
 </p:sld>
 </file>
 
-<file path=ppt/slides/slide6.xml><?xml version="1.0" encoding="utf-8"?>
+<file path=ppt/slides/slide7.xml><?xml version="1.0" encoding="utf-8"?>
 <p:sld xmlns:a="http://schemas.openxmlformats.org/drawingml/2006/main" xmlns:r="http://schemas.openxmlformats.org/officeDocument/2006/relationships" xmlns:p="http://schemas.openxmlformats.org/presentationml/2006/main">
   <p:cSld>
     <p:spTree>
@@ -17468,7 +19331,7 @@
 </p:sld>
 </file>
 
-<file path=ppt/slides/slide7.xml><?xml version="1.0" encoding="utf-8"?>
+<file path=ppt/slides/slide8.xml><?xml version="1.0" encoding="utf-8"?>
 <p:sld xmlns:a="http://schemas.openxmlformats.org/drawingml/2006/main" xmlns:r="http://schemas.openxmlformats.org/officeDocument/2006/relationships" xmlns:p="http://schemas.openxmlformats.org/presentationml/2006/main">
   <p:cSld>
     <p:spTree>
@@ -18478,7 +20341,7 @@
 </p:sld>
 </file>
 
-<file path=ppt/slides/slide8.xml><?xml version="1.0" encoding="utf-8"?>
+<file path=ppt/slides/slide9.xml><?xml version="1.0" encoding="utf-8"?>
 <p:sld xmlns:a="http://schemas.openxmlformats.org/drawingml/2006/main" xmlns:r="http://schemas.openxmlformats.org/officeDocument/2006/relationships" xmlns:p="http://schemas.openxmlformats.org/presentationml/2006/main">
   <p:cSld>
     <p:spTree>
@@ -20445,1796 +22308,6 @@
 </p:sld>
 </file>
 
-<file path=ppt/slides/slide9.xml><?xml version="1.0" encoding="utf-8"?>
-<p:sld xmlns:a="http://schemas.openxmlformats.org/drawingml/2006/main" xmlns:r="http://schemas.openxmlformats.org/officeDocument/2006/relationships" xmlns:p="http://schemas.openxmlformats.org/presentationml/2006/main">
-  <p:cSld>
-    <p:spTree>
-      <p:nvGrpSpPr>
-        <p:cNvPr id="1" name=""/>
-        <p:cNvGrpSpPr/>
-        <p:nvPr/>
-      </p:nvGrpSpPr>
-      <p:grpSpPr>
-        <a:xfrm>
-          <a:off x="0" y="0"/>
-          <a:ext cx="0" cy="0"/>
-          <a:chOff x="0" y="0"/>
-          <a:chExt cx="0" cy="0"/>
-        </a:xfrm>
-      </p:grpSpPr>
-      <p:sp>
-        <p:nvSpPr>
-          <p:cNvPr id="2" name="Titel 1"/>
-          <p:cNvSpPr>
-            <a:spLocks noGrp="1"/>
-          </p:cNvSpPr>
-          <p:nvPr>
-            <p:ph type="title"/>
-          </p:nvPr>
-        </p:nvSpPr>
-        <p:spPr/>
-        <p:txBody>
-          <a:bodyPr/>
-          <a:lstStyle/>
-          <a:p>
-            <a:r>
-              <a:rPr lang="nl-NL" sz="1800" dirty="0"/>
-              <a:t>Arp </a:t>
-            </a:r>
-            <a:r>
-              <a:rPr lang="nl-NL" sz="1800" dirty="0" err="1"/>
-              <a:t>Spoofing</a:t>
-            </a:r>
-            <a:endParaRPr lang="nl-NL" sz="1800" dirty="0"/>
-          </a:p>
-        </p:txBody>
-      </p:sp>
-      <p:grpSp>
-        <p:nvGrpSpPr>
-          <p:cNvPr id="13" name="Groep 12">
-            <a:extLst>
-              <a:ext uri="{FF2B5EF4-FFF2-40B4-BE49-F238E27FC236}">
-                <a16:creationId xmlns:a16="http://schemas.microsoft.com/office/drawing/2014/main" id="{EF8FA028-9C3F-403C-8BB0-1E5E5D5629A6}"/>
-              </a:ext>
-            </a:extLst>
-          </p:cNvPr>
-          <p:cNvGrpSpPr/>
-          <p:nvPr/>
-        </p:nvGrpSpPr>
-        <p:grpSpPr>
-          <a:xfrm>
-            <a:off x="1693185" y="1174800"/>
-            <a:ext cx="2251836" cy="1400530"/>
-            <a:chOff x="2667000" y="1143000"/>
-            <a:chExt cx="6858000" cy="4572000"/>
-          </a:xfrm>
-        </p:grpSpPr>
-        <p:pic>
-          <p:nvPicPr>
-            <p:cNvPr id="1026" name="Picture 2" descr="Afbeeldingsresultaat voor computer razerblade">
-              <a:extLst>
-                <a:ext uri="{FF2B5EF4-FFF2-40B4-BE49-F238E27FC236}">
-                  <a16:creationId xmlns:a16="http://schemas.microsoft.com/office/drawing/2014/main" id="{A8BBE771-0BF0-4657-87DF-B46171A91763}"/>
-                </a:ext>
-              </a:extLst>
-            </p:cNvPr>
-            <p:cNvPicPr>
-              <a:picLocks noChangeAspect="1" noChangeArrowheads="1"/>
-            </p:cNvPicPr>
-            <p:nvPr/>
-          </p:nvPicPr>
-          <p:blipFill>
-            <a:blip r:embed="rId3" cstate="print">
-              <a:duotone>
-                <a:prstClr val="black"/>
-                <a:srgbClr val="FF0000">
-                  <a:tint val="45000"/>
-                  <a:satMod val="400000"/>
-                </a:srgbClr>
-              </a:duotone>
-              <a:extLst>
-                <a:ext uri="{BEBA8EAE-BF5A-486C-A8C5-ECC9F3942E4B}">
-                  <a14:imgProps xmlns:a14="http://schemas.microsoft.com/office/drawing/2010/main">
-                    <a14:imgLayer r:embed="rId4">
-                      <a14:imgEffect>
-                        <a14:backgroundRemoval t="8958" b="90000" l="10000" r="90000">
-                          <a14:foregroundMark x1="28472" y1="50417" x2="15139" y2="88750"/>
-                          <a14:foregroundMark x1="15139" y1="88750" x2="37083" y2="91458"/>
-                          <a14:foregroundMark x1="37083" y1="91458" x2="51806" y2="88542"/>
-                          <a14:foregroundMark x1="51806" y1="88542" x2="77083" y2="90417"/>
-                          <a14:foregroundMark x1="77083" y1="90417" x2="84167" y2="88958"/>
-                          <a14:foregroundMark x1="84167" y1="88958" x2="84444" y2="77292"/>
-                          <a14:foregroundMark x1="84444" y1="77292" x2="79306" y2="67292"/>
-                          <a14:foregroundMark x1="79306" y1="67292" x2="74861" y2="27083"/>
-                          <a14:foregroundMark x1="74861" y1="27083" x2="74722" y2="16250"/>
-                          <a14:foregroundMark x1="74722" y1="16250" x2="68611" y2="11042"/>
-                          <a14:foregroundMark x1="68611" y1="11042" x2="61667" y2="8958"/>
-                          <a14:foregroundMark x1="61667" y1="8958" x2="39444" y2="12083"/>
-                          <a14:foregroundMark x1="39444" y1="12083" x2="29861" y2="10000"/>
-                        </a14:backgroundRemoval>
-                      </a14:imgEffect>
-                    </a14:imgLayer>
-                  </a14:imgProps>
-                </a:ext>
-                <a:ext uri="{28A0092B-C50C-407E-A947-70E740481C1C}">
-                  <a14:useLocalDpi xmlns:a14="http://schemas.microsoft.com/office/drawing/2010/main" val="0"/>
-                </a:ext>
-              </a:extLst>
-            </a:blip>
-            <a:srcRect/>
-            <a:stretch>
-              <a:fillRect/>
-            </a:stretch>
-          </p:blipFill>
-          <p:spPr bwMode="auto">
-            <a:xfrm>
-              <a:off x="2667000" y="1143000"/>
-              <a:ext cx="6858000" cy="4572000"/>
-            </a:xfrm>
-            <a:prstGeom prst="rect">
-              <a:avLst/>
-            </a:prstGeom>
-            <a:noFill/>
-            <a:extLst>
-              <a:ext uri="{909E8E84-426E-40DD-AFC4-6F175D3DCCD1}">
-                <a14:hiddenFill xmlns:a14="http://schemas.microsoft.com/office/drawing/2010/main">
-                  <a:solidFill>
-                    <a:srgbClr val="FFFFFF"/>
-                  </a:solidFill>
-                </a14:hiddenFill>
-              </a:ext>
-            </a:extLst>
-          </p:spPr>
-        </p:pic>
-        <p:sp>
-          <p:nvSpPr>
-            <p:cNvPr id="12" name="Rechthoek 11">
-              <a:extLst>
-                <a:ext uri="{FF2B5EF4-FFF2-40B4-BE49-F238E27FC236}">
-                  <a16:creationId xmlns:a16="http://schemas.microsoft.com/office/drawing/2014/main" id="{E92C533C-2713-426B-933C-69C055F20E83}"/>
-                </a:ext>
-              </a:extLst>
-            </p:cNvPr>
-            <p:cNvSpPr/>
-            <p:nvPr/>
-          </p:nvSpPr>
-          <p:spPr>
-            <a:xfrm>
-              <a:off x="4109662" y="1530849"/>
-              <a:ext cx="4027471" cy="2393879"/>
-            </a:xfrm>
-            <a:prstGeom prst="rect">
-              <a:avLst/>
-            </a:prstGeom>
-          </p:spPr>
-          <p:style>
-            <a:lnRef idx="2">
-              <a:schemeClr val="dk1">
-                <a:shade val="50000"/>
-              </a:schemeClr>
-            </a:lnRef>
-            <a:fillRef idx="1">
-              <a:schemeClr val="dk1"/>
-            </a:fillRef>
-            <a:effectRef idx="0">
-              <a:schemeClr val="dk1"/>
-            </a:effectRef>
-            <a:fontRef idx="minor">
-              <a:schemeClr val="lt1"/>
-            </a:fontRef>
-          </p:style>
-          <p:txBody>
-            <a:bodyPr rtlCol="0" anchor="ctr"/>
-            <a:lstStyle/>
-            <a:p>
-              <a:pPr algn="ctr"/>
-              <a:r>
-                <a:rPr lang="nl-NL" sz="2000" b="1" dirty="0">
-                  <a:solidFill>
-                    <a:srgbClr val="FF0000"/>
-                  </a:solidFill>
-                </a:rPr>
-                <a:t>HACKER</a:t>
-              </a:r>
-            </a:p>
-          </p:txBody>
-        </p:sp>
-      </p:grpSp>
-      <p:grpSp>
-        <p:nvGrpSpPr>
-          <p:cNvPr id="16" name="Groep 15">
-            <a:extLst>
-              <a:ext uri="{FF2B5EF4-FFF2-40B4-BE49-F238E27FC236}">
-                <a16:creationId xmlns:a16="http://schemas.microsoft.com/office/drawing/2014/main" id="{A0751BA8-8259-43A6-9062-78FE902E1DE6}"/>
-              </a:ext>
-            </a:extLst>
-          </p:cNvPr>
-          <p:cNvGrpSpPr/>
-          <p:nvPr/>
-        </p:nvGrpSpPr>
-        <p:grpSpPr>
-          <a:xfrm>
-            <a:off x="1153090" y="4977992"/>
-            <a:ext cx="2559333" cy="1233836"/>
-            <a:chOff x="5546977" y="2557328"/>
-            <a:chExt cx="3463459" cy="1877195"/>
-          </a:xfrm>
-        </p:grpSpPr>
-        <p:pic>
-          <p:nvPicPr>
-            <p:cNvPr id="14" name="Afbeelding 13">
-              <a:extLst>
-                <a:ext uri="{FF2B5EF4-FFF2-40B4-BE49-F238E27FC236}">
-                  <a16:creationId xmlns:a16="http://schemas.microsoft.com/office/drawing/2014/main" id="{54884391-9763-4752-9596-B2017AB49B9F}"/>
-                </a:ext>
-              </a:extLst>
-            </p:cNvPr>
-            <p:cNvPicPr>
-              <a:picLocks noChangeAspect="1"/>
-            </p:cNvPicPr>
-            <p:nvPr/>
-          </p:nvPicPr>
-          <p:blipFill>
-            <a:blip r:embed="rId5">
-              <a:extLst>
-                <a:ext uri="{BEBA8EAE-BF5A-486C-A8C5-ECC9F3942E4B}">
-                  <a14:imgProps xmlns:a14="http://schemas.microsoft.com/office/drawing/2010/main">
-                    <a14:imgLayer r:embed="rId6">
-                      <a14:imgEffect>
-                        <a14:backgroundRemoval t="0" b="97048" l="3800" r="90000">
-                          <a14:foregroundMark x1="24600" y1="16605" x2="17600" y2="11439"/>
-                          <a14:foregroundMark x1="17600" y1="16974" x2="18400" y2="52399"/>
-                          <a14:foregroundMark x1="16800" y1="11439" x2="25800" y2="3690"/>
-                          <a14:foregroundMark x1="25800" y1="3690" x2="48600" y2="0"/>
-                          <a14:foregroundMark x1="48600" y1="0" x2="64600" y2="738"/>
-                          <a14:foregroundMark x1="64600" y1="738" x2="66600" y2="2952"/>
-                          <a14:foregroundMark x1="44200" y1="59041" x2="44200" y2="59041"/>
-                          <a14:foregroundMark x1="47000" y1="59410" x2="67800" y2="57565"/>
-                          <a14:foregroundMark x1="67800" y1="57565" x2="69600" y2="2583"/>
-                          <a14:foregroundMark x1="48400" y1="57565" x2="18600" y2="54613"/>
-                          <a14:foregroundMark x1="34600" y1="59041" x2="34600" y2="59041"/>
-                          <a14:foregroundMark x1="34200" y1="59779" x2="30200" y2="61255"/>
-                          <a14:foregroundMark x1="29600" y1="61255" x2="28200" y2="61255"/>
-                          <a14:foregroundMark x1="25800" y1="59779" x2="25800" y2="59779"/>
-                          <a14:foregroundMark x1="24400" y1="59779" x2="23800" y2="59779"/>
-                          <a14:foregroundMark x1="22800" y1="59041" x2="22000" y2="58303"/>
-                          <a14:foregroundMark x1="17400" y1="10701" x2="25200" y2="369"/>
-                          <a14:foregroundMark x1="34600" y1="57934" x2="44800" y2="58672"/>
-                          <a14:foregroundMark x1="44800" y1="58672" x2="46400" y2="58303"/>
-                          <a14:foregroundMark x1="69200" y1="26199" x2="68400" y2="59779"/>
-                          <a14:foregroundMark x1="12400" y1="90037" x2="22800" y2="92989"/>
-                          <a14:foregroundMark x1="22800" y1="92989" x2="45600" y2="86716"/>
-                          <a14:foregroundMark x1="45600" y1="86716" x2="56600" y2="86716"/>
-                          <a14:foregroundMark x1="56600" y1="86716" x2="66200" y2="84871"/>
-                          <a14:foregroundMark x1="22000" y1="85609" x2="10800" y2="91144"/>
-                          <a14:foregroundMark x1="12200" y1="90775" x2="17400" y2="85240"/>
-                          <a14:foregroundMark x1="12600" y1="90406" x2="9000" y2="83395"/>
-                          <a14:foregroundMark x1="10200" y1="82657" x2="10200" y2="82657"/>
-                          <a14:foregroundMark x1="10200" y1="82657" x2="11600" y2="82657"/>
-                          <a14:foregroundMark x1="13600" y1="83395" x2="13600" y2="83395"/>
-                          <a14:foregroundMark x1="15200" y1="83764" x2="15800" y2="83764"/>
-                          <a14:foregroundMark x1="16800" y1="83764" x2="16800" y2="83764"/>
-                          <a14:foregroundMark x1="17200" y1="83764" x2="17200" y2="83764"/>
-                          <a14:foregroundMark x1="17000" y1="82288" x2="15000" y2="82288"/>
-                          <a14:foregroundMark x1="7200" y1="88192" x2="7600" y2="90775"/>
-                          <a14:foregroundMark x1="8200" y1="93358" x2="8200" y2="93358"/>
-                          <a14:foregroundMark x1="8200" y1="93358" x2="8200" y2="93358"/>
-                          <a14:foregroundMark x1="7800" y1="93358" x2="8600" y2="92989"/>
-                          <a14:foregroundMark x1="42600" y1="97048" x2="42600" y2="97048"/>
-                          <a14:foregroundMark x1="40000" y1="96679" x2="40000" y2="96679"/>
-                          <a14:foregroundMark x1="34400" y1="97048" x2="30800" y2="97048"/>
-                          <a14:foregroundMark x1="7800" y1="96679" x2="7800" y2="96679"/>
-                          <a14:foregroundMark x1="11800" y1="94834" x2="21800" y2="95941"/>
-                          <a14:foregroundMark x1="21800" y1="95941" x2="28600" y2="95203"/>
-                          <a14:foregroundMark x1="5400" y1="94834" x2="3800" y2="96310"/>
-                        </a14:backgroundRemoval>
-                      </a14:imgEffect>
-                    </a14:imgLayer>
-                  </a14:imgProps>
-                </a:ext>
-              </a:extLst>
-            </a:blip>
-            <a:stretch>
-              <a:fillRect/>
-            </a:stretch>
-          </p:blipFill>
-          <p:spPr>
-            <a:xfrm>
-              <a:off x="5546977" y="2557328"/>
-              <a:ext cx="3463459" cy="1877195"/>
-            </a:xfrm>
-            <a:prstGeom prst="rect">
-              <a:avLst/>
-            </a:prstGeom>
-          </p:spPr>
-        </p:pic>
-        <p:sp>
-          <p:nvSpPr>
-            <p:cNvPr id="15" name="Rechthoek 14">
-              <a:extLst>
-                <a:ext uri="{FF2B5EF4-FFF2-40B4-BE49-F238E27FC236}">
-                  <a16:creationId xmlns:a16="http://schemas.microsoft.com/office/drawing/2014/main" id="{E42915D5-BA79-46A9-A908-D57DF97E86F8}"/>
-                </a:ext>
-              </a:extLst>
-            </p:cNvPr>
-            <p:cNvSpPr/>
-            <p:nvPr/>
-          </p:nvSpPr>
-          <p:spPr>
-            <a:xfrm>
-              <a:off x="6185043" y="2557329"/>
-              <a:ext cx="1743184" cy="1110546"/>
-            </a:xfrm>
-            <a:prstGeom prst="rect">
-              <a:avLst/>
-            </a:prstGeom>
-          </p:spPr>
-          <p:style>
-            <a:lnRef idx="2">
-              <a:schemeClr val="dk1">
-                <a:shade val="50000"/>
-              </a:schemeClr>
-            </a:lnRef>
-            <a:fillRef idx="1">
-              <a:schemeClr val="dk1"/>
-            </a:fillRef>
-            <a:effectRef idx="0">
-              <a:schemeClr val="dk1"/>
-            </a:effectRef>
-            <a:fontRef idx="minor">
-              <a:schemeClr val="lt1"/>
-            </a:fontRef>
-          </p:style>
-          <p:txBody>
-            <a:bodyPr rtlCol="0" anchor="ctr"/>
-            <a:lstStyle/>
-            <a:p>
-              <a:pPr algn="ctr"/>
-              <a:r>
-                <a:rPr lang="nl-NL" sz="2400" b="1" dirty="0"/>
-                <a:t>Doelwit</a:t>
-              </a:r>
-            </a:p>
-          </p:txBody>
-        </p:sp>
-      </p:grpSp>
-      <p:pic>
-        <p:nvPicPr>
-          <p:cNvPr id="17" name="Afbeelding 16">
-            <a:extLst>
-              <a:ext uri="{FF2B5EF4-FFF2-40B4-BE49-F238E27FC236}">
-                <a16:creationId xmlns:a16="http://schemas.microsoft.com/office/drawing/2014/main" id="{7D0B8662-4BC1-4E5B-91FA-1F844390027C}"/>
-              </a:ext>
-            </a:extLst>
-          </p:cNvPr>
-          <p:cNvPicPr>
-            <a:picLocks noChangeAspect="1"/>
-          </p:cNvPicPr>
-          <p:nvPr/>
-        </p:nvPicPr>
-        <p:blipFill>
-          <a:blip r:embed="rId7">
-            <a:extLst>
-              <a:ext uri="{BEBA8EAE-BF5A-486C-A8C5-ECC9F3942E4B}">
-                <a14:imgProps xmlns:a14="http://schemas.microsoft.com/office/drawing/2010/main">
-                  <a14:imgLayer r:embed="rId8">
-                    <a14:imgEffect>
-                      <a14:backgroundRemoval t="3077" b="97179" l="5450" r="94313">
-                        <a14:foregroundMark x1="12559" y1="24103" x2="6635" y2="10000"/>
-                        <a14:foregroundMark x1="50000" y1="12564" x2="50000" y2="3077"/>
-                        <a14:foregroundMark x1="73697" y1="51538" x2="76540" y2="38462"/>
-                        <a14:foregroundMark x1="76540" y1="38462" x2="94313" y2="9231"/>
-                        <a14:foregroundMark x1="74645" y1="86410" x2="63033" y2="90256"/>
-                        <a14:foregroundMark x1="63033" y1="90256" x2="50474" y2="89744"/>
-                        <a14:foregroundMark x1="50474" y1="89744" x2="38389" y2="92564"/>
-                        <a14:foregroundMark x1="38389" y1="92564" x2="30095" y2="92051"/>
-                        <a14:foregroundMark x1="50711" y1="97179" x2="50711" y2="97179"/>
-                        <a14:foregroundMark x1="50474" y1="97179" x2="48578" y2="96923"/>
-                        <a14:foregroundMark x1="48578" y1="96923" x2="46445" y2="96410"/>
-                      </a14:backgroundRemoval>
-                    </a14:imgEffect>
-                  </a14:imgLayer>
-                </a14:imgProps>
-              </a:ext>
-            </a:extLst>
-          </a:blip>
-          <a:stretch>
-            <a:fillRect/>
-          </a:stretch>
-        </p:blipFill>
-        <p:spPr>
-          <a:xfrm>
-            <a:off x="7213417" y="2174286"/>
-            <a:ext cx="1875652" cy="1733422"/>
-          </a:xfrm>
-          <a:prstGeom prst="rect">
-            <a:avLst/>
-          </a:prstGeom>
-        </p:spPr>
-      </p:pic>
-      <p:pic>
-        <p:nvPicPr>
-          <p:cNvPr id="18" name="Afbeelding 17">
-            <a:extLst>
-              <a:ext uri="{FF2B5EF4-FFF2-40B4-BE49-F238E27FC236}">
-                <a16:creationId xmlns:a16="http://schemas.microsoft.com/office/drawing/2014/main" id="{9567991A-A0CF-48D8-A804-0B8A7FEA6765}"/>
-              </a:ext>
-            </a:extLst>
-          </p:cNvPr>
-          <p:cNvPicPr>
-            <a:picLocks noChangeAspect="1"/>
-          </p:cNvPicPr>
-          <p:nvPr/>
-        </p:nvPicPr>
-        <p:blipFill>
-          <a:blip r:embed="rId9">
-            <a:extLst>
-              <a:ext uri="{BEBA8EAE-BF5A-486C-A8C5-ECC9F3942E4B}">
-                <a14:imgProps xmlns:a14="http://schemas.microsoft.com/office/drawing/2010/main">
-                  <a14:imgLayer r:embed="rId10">
-                    <a14:imgEffect>
-                      <a14:backgroundRemoval t="10000" b="90000" l="10000" r="90000">
-                        <a14:foregroundMark x1="10547" y1="36230" x2="10742" y2="28809"/>
-                        <a14:foregroundMark x1="10742" y1="28809" x2="15625" y2="23242"/>
-                        <a14:foregroundMark x1="15625" y1="23242" x2="21875" y2="19434"/>
-                        <a14:foregroundMark x1="21875" y1="19434" x2="25879" y2="18555"/>
-                        <a14:foregroundMark x1="24512" y1="19629" x2="21191" y2="16016"/>
-                        <a14:foregroundMark x1="25098" y1="18262" x2="25098" y2="17871"/>
-                      </a14:backgroundRemoval>
-                    </a14:imgEffect>
-                  </a14:imgLayer>
-                </a14:imgProps>
-              </a:ext>
-            </a:extLst>
-          </a:blip>
-          <a:stretch>
-            <a:fillRect/>
-          </a:stretch>
-        </p:blipFill>
-        <p:spPr>
-          <a:xfrm>
-            <a:off x="10845436" y="2082436"/>
-            <a:ext cx="2693128" cy="2693128"/>
-          </a:xfrm>
-          <a:prstGeom prst="rect">
-            <a:avLst/>
-          </a:prstGeom>
-        </p:spPr>
-      </p:pic>
-      <p:cxnSp>
-        <p:nvCxnSpPr>
-          <p:cNvPr id="8" name="Rechte verbindingslijn met pijl 7">
-            <a:extLst>
-              <a:ext uri="{FF2B5EF4-FFF2-40B4-BE49-F238E27FC236}">
-                <a16:creationId xmlns:a16="http://schemas.microsoft.com/office/drawing/2014/main" id="{D59D01F2-51A9-4BDE-9711-45D2F22DA41A}"/>
-              </a:ext>
-            </a:extLst>
-          </p:cNvPr>
-          <p:cNvCxnSpPr>
-            <a:endCxn id="18" idx="1"/>
-          </p:cNvCxnSpPr>
-          <p:nvPr/>
-        </p:nvCxnSpPr>
-        <p:spPr>
-          <a:xfrm>
-            <a:off x="9089069" y="3429000"/>
-            <a:ext cx="1756367" cy="0"/>
-          </a:xfrm>
-          <a:prstGeom prst="straightConnector1">
-            <a:avLst/>
-          </a:prstGeom>
-          <a:ln w="76200">
-            <a:solidFill>
-              <a:srgbClr val="0070C0"/>
-            </a:solidFill>
-            <a:headEnd type="triangle"/>
-            <a:tailEnd type="triangle"/>
-          </a:ln>
-        </p:spPr>
-        <p:style>
-          <a:lnRef idx="3">
-            <a:schemeClr val="dk1"/>
-          </a:lnRef>
-          <a:fillRef idx="0">
-            <a:schemeClr val="dk1"/>
-          </a:fillRef>
-          <a:effectRef idx="2">
-            <a:schemeClr val="dk1"/>
-          </a:effectRef>
-          <a:fontRef idx="minor">
-            <a:schemeClr val="tx1"/>
-          </a:fontRef>
-        </p:style>
-      </p:cxnSp>
-      <p:sp>
-        <p:nvSpPr>
-          <p:cNvPr id="26" name="Vrije vorm: vorm 25">
-            <a:extLst>
-              <a:ext uri="{FF2B5EF4-FFF2-40B4-BE49-F238E27FC236}">
-                <a16:creationId xmlns:a16="http://schemas.microsoft.com/office/drawing/2014/main" id="{18F3C64D-A28E-420D-AF14-0FCA32378C1C}"/>
-              </a:ext>
-            </a:extLst>
-          </p:cNvPr>
-          <p:cNvSpPr/>
-          <p:nvPr/>
-        </p:nvSpPr>
-        <p:spPr>
-          <a:xfrm>
-            <a:off x="4098876" y="2174286"/>
-            <a:ext cx="2897312" cy="924674"/>
-          </a:xfrm>
-          <a:custGeom>
-            <a:avLst/>
-            <a:gdLst>
-              <a:gd name="connsiteX0" fmla="*/ 2897312 w 2897312"/>
-              <a:gd name="connsiteY0" fmla="*/ 924674 h 924674"/>
-              <a:gd name="connsiteX1" fmla="*/ 1643865 w 2897312"/>
-              <a:gd name="connsiteY1" fmla="*/ 184935 h 924674"/>
-              <a:gd name="connsiteX2" fmla="*/ 0 w 2897312"/>
-              <a:gd name="connsiteY2" fmla="*/ 0 h 924674"/>
-            </a:gdLst>
-            <a:ahLst/>
-            <a:cxnLst>
-              <a:cxn ang="0">
-                <a:pos x="connsiteX0" y="connsiteY0"/>
-              </a:cxn>
-              <a:cxn ang="0">
-                <a:pos x="connsiteX1" y="connsiteY1"/>
-              </a:cxn>
-              <a:cxn ang="0">
-                <a:pos x="connsiteX2" y="connsiteY2"/>
-              </a:cxn>
-            </a:cxnLst>
-            <a:rect l="l" t="t" r="r" b="b"/>
-            <a:pathLst>
-              <a:path w="2897312" h="924674">
-                <a:moveTo>
-                  <a:pt x="2897312" y="924674"/>
-                </a:moveTo>
-                <a:cubicBezTo>
-                  <a:pt x="2512031" y="631860"/>
-                  <a:pt x="2126750" y="339047"/>
-                  <a:pt x="1643865" y="184935"/>
-                </a:cubicBezTo>
-                <a:cubicBezTo>
-                  <a:pt x="1160980" y="30823"/>
-                  <a:pt x="251717" y="27398"/>
-                  <a:pt x="0" y="0"/>
-                </a:cubicBezTo>
-              </a:path>
-            </a:pathLst>
-          </a:custGeom>
-          <a:noFill/>
-          <a:ln w="28575">
-            <a:solidFill>
-              <a:schemeClr val="tx1"/>
-            </a:solidFill>
-            <a:headEnd type="none" w="med" len="med"/>
-            <a:tailEnd type="arrow" w="med" len="med"/>
-          </a:ln>
-        </p:spPr>
-        <p:style>
-          <a:lnRef idx="2">
-            <a:schemeClr val="accent1">
-              <a:shade val="50000"/>
-            </a:schemeClr>
-          </a:lnRef>
-          <a:fillRef idx="1">
-            <a:schemeClr val="accent1"/>
-          </a:fillRef>
-          <a:effectRef idx="0">
-            <a:schemeClr val="accent1"/>
-          </a:effectRef>
-          <a:fontRef idx="minor">
-            <a:schemeClr val="lt1"/>
-          </a:fontRef>
-        </p:style>
-        <p:txBody>
-          <a:bodyPr rtlCol="0" anchor="ctr"/>
-          <a:lstStyle/>
-          <a:p>
-            <a:pPr algn="ctr"/>
-            <a:endParaRPr lang="nl-NL"/>
-          </a:p>
-        </p:txBody>
-      </p:sp>
-      <p:sp>
-        <p:nvSpPr>
-          <p:cNvPr id="28" name="Vrije vorm: vorm 27">
-            <a:extLst>
-              <a:ext uri="{FF2B5EF4-FFF2-40B4-BE49-F238E27FC236}">
-                <a16:creationId xmlns:a16="http://schemas.microsoft.com/office/drawing/2014/main" id="{68E98539-0C13-47FC-984D-9CB49D9B6EEF}"/>
-              </a:ext>
-            </a:extLst>
-          </p:cNvPr>
-          <p:cNvSpPr/>
-          <p:nvPr/>
-        </p:nvSpPr>
-        <p:spPr>
-          <a:xfrm rot="10800000">
-            <a:off x="4098876" y="2499575"/>
-            <a:ext cx="2897312" cy="924674"/>
-          </a:xfrm>
-          <a:custGeom>
-            <a:avLst/>
-            <a:gdLst>
-              <a:gd name="connsiteX0" fmla="*/ 2897312 w 2897312"/>
-              <a:gd name="connsiteY0" fmla="*/ 924674 h 924674"/>
-              <a:gd name="connsiteX1" fmla="*/ 1643865 w 2897312"/>
-              <a:gd name="connsiteY1" fmla="*/ 184935 h 924674"/>
-              <a:gd name="connsiteX2" fmla="*/ 0 w 2897312"/>
-              <a:gd name="connsiteY2" fmla="*/ 0 h 924674"/>
-              <a:gd name="connsiteX0" fmla="*/ 2897312 w 2897312"/>
-              <a:gd name="connsiteY0" fmla="*/ 924674 h 924674"/>
-              <a:gd name="connsiteX1" fmla="*/ 1613042 w 2897312"/>
-              <a:gd name="connsiteY1" fmla="*/ 297951 h 924674"/>
-              <a:gd name="connsiteX2" fmla="*/ 0 w 2897312"/>
-              <a:gd name="connsiteY2" fmla="*/ 0 h 924674"/>
-            </a:gdLst>
-            <a:ahLst/>
-            <a:cxnLst>
-              <a:cxn ang="0">
-                <a:pos x="connsiteX0" y="connsiteY0"/>
-              </a:cxn>
-              <a:cxn ang="0">
-                <a:pos x="connsiteX1" y="connsiteY1"/>
-              </a:cxn>
-              <a:cxn ang="0">
-                <a:pos x="connsiteX2" y="connsiteY2"/>
-              </a:cxn>
-            </a:cxnLst>
-            <a:rect l="l" t="t" r="r" b="b"/>
-            <a:pathLst>
-              <a:path w="2897312" h="924674">
-                <a:moveTo>
-                  <a:pt x="2897312" y="924674"/>
-                </a:moveTo>
-                <a:cubicBezTo>
-                  <a:pt x="2512031" y="631860"/>
-                  <a:pt x="2095927" y="452063"/>
-                  <a:pt x="1613042" y="297951"/>
-                </a:cubicBezTo>
-                <a:cubicBezTo>
-                  <a:pt x="1130157" y="143839"/>
-                  <a:pt x="251717" y="27398"/>
-                  <a:pt x="0" y="0"/>
-                </a:cubicBezTo>
-              </a:path>
-            </a:pathLst>
-          </a:custGeom>
-          <a:noFill/>
-          <a:ln w="28575">
-            <a:solidFill>
-              <a:schemeClr val="tx1"/>
-            </a:solidFill>
-            <a:headEnd type="none" w="med" len="med"/>
-            <a:tailEnd type="arrow" w="med" len="med"/>
-          </a:ln>
-        </p:spPr>
-        <p:style>
-          <a:lnRef idx="2">
-            <a:schemeClr val="accent1">
-              <a:shade val="50000"/>
-            </a:schemeClr>
-          </a:lnRef>
-          <a:fillRef idx="1">
-            <a:schemeClr val="accent1"/>
-          </a:fillRef>
-          <a:effectRef idx="0">
-            <a:schemeClr val="accent1"/>
-          </a:effectRef>
-          <a:fontRef idx="minor">
-            <a:schemeClr val="lt1"/>
-          </a:fontRef>
-        </p:style>
-        <p:txBody>
-          <a:bodyPr rtlCol="0" anchor="ctr"/>
-          <a:lstStyle/>
-          <a:p>
-            <a:pPr algn="ctr"/>
-            <a:endParaRPr lang="nl-NL"/>
-          </a:p>
-        </p:txBody>
-      </p:sp>
-      <p:sp>
-        <p:nvSpPr>
-          <p:cNvPr id="31" name="Vrije vorm: vorm 30">
-            <a:extLst>
-              <a:ext uri="{FF2B5EF4-FFF2-40B4-BE49-F238E27FC236}">
-                <a16:creationId xmlns:a16="http://schemas.microsoft.com/office/drawing/2014/main" id="{B7B74615-70DA-4A07-9FE4-22D7EB832CDC}"/>
-              </a:ext>
-            </a:extLst>
-          </p:cNvPr>
-          <p:cNvSpPr/>
-          <p:nvPr/>
-        </p:nvSpPr>
-        <p:spPr>
-          <a:xfrm rot="19292124" flipV="1">
-            <a:off x="2163366" y="2950808"/>
-            <a:ext cx="1619079" cy="1570768"/>
-          </a:xfrm>
-          <a:custGeom>
-            <a:avLst/>
-            <a:gdLst>
-              <a:gd name="connsiteX0" fmla="*/ 2897312 w 2897312"/>
-              <a:gd name="connsiteY0" fmla="*/ 924674 h 924674"/>
-              <a:gd name="connsiteX1" fmla="*/ 1643865 w 2897312"/>
-              <a:gd name="connsiteY1" fmla="*/ 184935 h 924674"/>
-              <a:gd name="connsiteX2" fmla="*/ 0 w 2897312"/>
-              <a:gd name="connsiteY2" fmla="*/ 0 h 924674"/>
-              <a:gd name="connsiteX0" fmla="*/ 2897312 w 2897312"/>
-              <a:gd name="connsiteY0" fmla="*/ 924674 h 924674"/>
-              <a:gd name="connsiteX1" fmla="*/ 1869193 w 2897312"/>
-              <a:gd name="connsiteY1" fmla="*/ 353534 h 924674"/>
-              <a:gd name="connsiteX2" fmla="*/ 0 w 2897312"/>
-              <a:gd name="connsiteY2" fmla="*/ 0 h 924674"/>
-              <a:gd name="connsiteX0" fmla="*/ 2727468 w 2727468"/>
-              <a:gd name="connsiteY0" fmla="*/ 881270 h 881270"/>
-              <a:gd name="connsiteX1" fmla="*/ 1699349 w 2727468"/>
-              <a:gd name="connsiteY1" fmla="*/ 310130 h 881270"/>
-              <a:gd name="connsiteX2" fmla="*/ 0 w 2727468"/>
-              <a:gd name="connsiteY2" fmla="*/ 0 h 881270"/>
-            </a:gdLst>
-            <a:ahLst/>
-            <a:cxnLst>
-              <a:cxn ang="0">
-                <a:pos x="connsiteX0" y="connsiteY0"/>
-              </a:cxn>
-              <a:cxn ang="0">
-                <a:pos x="connsiteX1" y="connsiteY1"/>
-              </a:cxn>
-              <a:cxn ang="0">
-                <a:pos x="connsiteX2" y="connsiteY2"/>
-              </a:cxn>
-            </a:cxnLst>
-            <a:rect l="l" t="t" r="r" b="b"/>
-            <a:pathLst>
-              <a:path w="2727468" h="881270">
-                <a:moveTo>
-                  <a:pt x="2727468" y="881270"/>
-                </a:moveTo>
-                <a:cubicBezTo>
-                  <a:pt x="2342187" y="588456"/>
-                  <a:pt x="2153927" y="457008"/>
-                  <a:pt x="1699349" y="310130"/>
-                </a:cubicBezTo>
-                <a:cubicBezTo>
-                  <a:pt x="1244771" y="163252"/>
-                  <a:pt x="251717" y="27398"/>
-                  <a:pt x="0" y="0"/>
-                </a:cubicBezTo>
-              </a:path>
-            </a:pathLst>
-          </a:custGeom>
-          <a:noFill/>
-          <a:ln w="28575">
-            <a:solidFill>
-              <a:schemeClr val="tx1"/>
-            </a:solidFill>
-            <a:headEnd type="none" w="med" len="med"/>
-            <a:tailEnd type="arrow" w="med" len="med"/>
-          </a:ln>
-        </p:spPr>
-        <p:style>
-          <a:lnRef idx="2">
-            <a:schemeClr val="accent1">
-              <a:shade val="50000"/>
-            </a:schemeClr>
-          </a:lnRef>
-          <a:fillRef idx="1">
-            <a:schemeClr val="accent1"/>
-          </a:fillRef>
-          <a:effectRef idx="0">
-            <a:schemeClr val="accent1"/>
-          </a:effectRef>
-          <a:fontRef idx="minor">
-            <a:schemeClr val="lt1"/>
-          </a:fontRef>
-        </p:style>
-        <p:txBody>
-          <a:bodyPr rtlCol="0" anchor="ctr"/>
-          <a:lstStyle/>
-          <a:p>
-            <a:pPr algn="ctr"/>
-            <a:endParaRPr lang="nl-NL"/>
-          </a:p>
-        </p:txBody>
-      </p:sp>
-      <p:sp>
-        <p:nvSpPr>
-          <p:cNvPr id="27" name="Tekstvak 26">
-            <a:extLst>
-              <a:ext uri="{FF2B5EF4-FFF2-40B4-BE49-F238E27FC236}">
-                <a16:creationId xmlns:a16="http://schemas.microsoft.com/office/drawing/2014/main" id="{27175844-C59F-45C6-A1AF-4CB47336CCFE}"/>
-              </a:ext>
-            </a:extLst>
-          </p:cNvPr>
-          <p:cNvSpPr txBox="1"/>
-          <p:nvPr/>
-        </p:nvSpPr>
-        <p:spPr>
-          <a:xfrm rot="1216658">
-            <a:off x="4664254" y="3117271"/>
-            <a:ext cx="1633591" cy="400110"/>
-          </a:xfrm>
-          <a:prstGeom prst="rect">
-            <a:avLst/>
-          </a:prstGeom>
-          <a:noFill/>
-        </p:spPr>
-        <p:txBody>
-          <a:bodyPr wrap="square" rtlCol="0">
-            <a:spAutoFit/>
-          </a:bodyPr>
-          <a:lstStyle/>
-          <a:p>
-            <a:r>
-              <a:rPr lang="nl-NL" sz="2000" b="1" dirty="0">
-                <a:solidFill>
-                  <a:srgbClr val="00B0F0"/>
-                </a:solidFill>
-                <a:effectLst>
-                  <a:outerShdw blurRad="38100" dist="38100" dir="2700000" algn="tl">
-                    <a:srgbClr val="000000">
-                      <a:alpha val="43137"/>
-                    </a:srgbClr>
-                  </a:outerShdw>
-                </a:effectLst>
-              </a:rPr>
-              <a:t>Verzoek</a:t>
-            </a:r>
-          </a:p>
-        </p:txBody>
-      </p:sp>
-      <p:sp>
-        <p:nvSpPr>
-          <p:cNvPr id="33" name="Tekstvak 32">
-            <a:extLst>
-              <a:ext uri="{FF2B5EF4-FFF2-40B4-BE49-F238E27FC236}">
-                <a16:creationId xmlns:a16="http://schemas.microsoft.com/office/drawing/2014/main" id="{D6B27B67-3C7E-43B0-9867-49C38FC1DA6D}"/>
-              </a:ext>
-            </a:extLst>
-          </p:cNvPr>
-          <p:cNvSpPr txBox="1"/>
-          <p:nvPr/>
-        </p:nvSpPr>
-        <p:spPr>
-          <a:xfrm rot="5400000">
-            <a:off x="1005506" y="3723824"/>
-            <a:ext cx="1633591" cy="400110"/>
-          </a:xfrm>
-          <a:prstGeom prst="rect">
-            <a:avLst/>
-          </a:prstGeom>
-          <a:noFill/>
-        </p:spPr>
-        <p:txBody>
-          <a:bodyPr wrap="square" rtlCol="0">
-            <a:spAutoFit/>
-          </a:bodyPr>
-          <a:lstStyle/>
-          <a:p>
-            <a:r>
-              <a:rPr lang="nl-NL" sz="2000" b="1" dirty="0">
-                <a:solidFill>
-                  <a:srgbClr val="00B0F0"/>
-                </a:solidFill>
-                <a:effectLst>
-                  <a:outerShdw blurRad="38100" dist="38100" dir="2700000" algn="tl">
-                    <a:srgbClr val="000000">
-                      <a:alpha val="43137"/>
-                    </a:srgbClr>
-                  </a:outerShdw>
-                </a:effectLst>
-              </a:rPr>
-              <a:t>Verzoek</a:t>
-            </a:r>
-          </a:p>
-        </p:txBody>
-      </p:sp>
-      <p:sp>
-        <p:nvSpPr>
-          <p:cNvPr id="34" name="Tekstvak 33">
-            <a:extLst>
-              <a:ext uri="{FF2B5EF4-FFF2-40B4-BE49-F238E27FC236}">
-                <a16:creationId xmlns:a16="http://schemas.microsoft.com/office/drawing/2014/main" id="{9A830D31-1DA9-46E4-BEA0-02FD1E9E2A3F}"/>
-              </a:ext>
-            </a:extLst>
-          </p:cNvPr>
-          <p:cNvSpPr txBox="1"/>
-          <p:nvPr/>
-        </p:nvSpPr>
-        <p:spPr>
-          <a:xfrm rot="5400000">
-            <a:off x="2680548" y="3635468"/>
-            <a:ext cx="1633591" cy="400110"/>
-          </a:xfrm>
-          <a:prstGeom prst="rect">
-            <a:avLst/>
-          </a:prstGeom>
-          <a:noFill/>
-        </p:spPr>
-        <p:txBody>
-          <a:bodyPr wrap="square" rtlCol="0">
-            <a:spAutoFit/>
-          </a:bodyPr>
-          <a:lstStyle/>
-          <a:p>
-            <a:r>
-              <a:rPr lang="nl-NL" sz="2000" b="1" dirty="0">
-                <a:solidFill>
-                  <a:srgbClr val="FFC000"/>
-                </a:solidFill>
-                <a:effectLst>
-                  <a:outerShdw blurRad="38100" dist="38100" dir="2700000" algn="tl">
-                    <a:srgbClr val="000000">
-                      <a:alpha val="43137"/>
-                    </a:srgbClr>
-                  </a:outerShdw>
-                </a:effectLst>
-              </a:rPr>
-              <a:t>Antwoord</a:t>
-            </a:r>
-          </a:p>
-        </p:txBody>
-      </p:sp>
-      <p:sp>
-        <p:nvSpPr>
-          <p:cNvPr id="35" name="Tekstvak 34">
-            <a:extLst>
-              <a:ext uri="{FF2B5EF4-FFF2-40B4-BE49-F238E27FC236}">
-                <a16:creationId xmlns:a16="http://schemas.microsoft.com/office/drawing/2014/main" id="{951EFBEE-2BCB-484A-B32D-3EEED844577C}"/>
-              </a:ext>
-            </a:extLst>
-          </p:cNvPr>
-          <p:cNvSpPr txBox="1"/>
-          <p:nvPr/>
-        </p:nvSpPr>
-        <p:spPr>
-          <a:xfrm rot="1002512">
-            <a:off x="5108365" y="2035410"/>
-            <a:ext cx="1633591" cy="400110"/>
-          </a:xfrm>
-          <a:prstGeom prst="rect">
-            <a:avLst/>
-          </a:prstGeom>
-          <a:noFill/>
-        </p:spPr>
-        <p:txBody>
-          <a:bodyPr wrap="square" rtlCol="0">
-            <a:spAutoFit/>
-          </a:bodyPr>
-          <a:lstStyle/>
-          <a:p>
-            <a:r>
-              <a:rPr lang="nl-NL" sz="2000" b="1" dirty="0">
-                <a:solidFill>
-                  <a:srgbClr val="FFC000"/>
-                </a:solidFill>
-                <a:effectLst>
-                  <a:outerShdw blurRad="38100" dist="38100" dir="2700000" algn="tl">
-                    <a:srgbClr val="000000">
-                      <a:alpha val="43137"/>
-                    </a:srgbClr>
-                  </a:outerShdw>
-                </a:effectLst>
-              </a:rPr>
-              <a:t>Antwoord</a:t>
-            </a:r>
-          </a:p>
-        </p:txBody>
-      </p:sp>
-      <p:sp>
-        <p:nvSpPr>
-          <p:cNvPr id="3" name="Vrije vorm: vorm 2">
-            <a:extLst>
-              <a:ext uri="{FF2B5EF4-FFF2-40B4-BE49-F238E27FC236}">
-                <a16:creationId xmlns:a16="http://schemas.microsoft.com/office/drawing/2014/main" id="{08760AC4-088A-49DC-8DB8-684C27E24F0D}"/>
-              </a:ext>
-            </a:extLst>
-          </p:cNvPr>
-          <p:cNvSpPr/>
-          <p:nvPr/>
-        </p:nvSpPr>
-        <p:spPr>
-          <a:xfrm>
-            <a:off x="2020099" y="2609636"/>
-            <a:ext cx="342957" cy="2188395"/>
-          </a:xfrm>
-          <a:custGeom>
-            <a:avLst/>
-            <a:gdLst>
-              <a:gd name="connsiteX0" fmla="*/ 188845 w 342957"/>
-              <a:gd name="connsiteY0" fmla="*/ 2188395 h 2188395"/>
-              <a:gd name="connsiteX1" fmla="*/ 3910 w 342957"/>
-              <a:gd name="connsiteY1" fmla="*/ 1047964 h 2188395"/>
-              <a:gd name="connsiteX2" fmla="*/ 342957 w 342957"/>
-              <a:gd name="connsiteY2" fmla="*/ 0 h 2188395"/>
-            </a:gdLst>
-            <a:ahLst/>
-            <a:cxnLst>
-              <a:cxn ang="0">
-                <a:pos x="connsiteX0" y="connsiteY0"/>
-              </a:cxn>
-              <a:cxn ang="0">
-                <a:pos x="connsiteX1" y="connsiteY1"/>
-              </a:cxn>
-              <a:cxn ang="0">
-                <a:pos x="connsiteX2" y="connsiteY2"/>
-              </a:cxn>
-            </a:cxnLst>
-            <a:rect l="l" t="t" r="r" b="b"/>
-            <a:pathLst>
-              <a:path w="342957" h="2188395">
-                <a:moveTo>
-                  <a:pt x="188845" y="2188395"/>
-                </a:moveTo>
-                <a:cubicBezTo>
-                  <a:pt x="83535" y="1800545"/>
-                  <a:pt x="-21775" y="1412696"/>
-                  <a:pt x="3910" y="1047964"/>
-                </a:cubicBezTo>
-                <a:cubicBezTo>
-                  <a:pt x="29595" y="683232"/>
-                  <a:pt x="277887" y="195209"/>
-                  <a:pt x="342957" y="0"/>
-                </a:cubicBezTo>
-              </a:path>
-            </a:pathLst>
-          </a:custGeom>
-          <a:noFill/>
-          <a:ln w="28575">
-            <a:solidFill>
-              <a:schemeClr val="tx1"/>
-            </a:solidFill>
-            <a:headEnd type="none" w="med" len="med"/>
-            <a:tailEnd type="arrow" w="med" len="med"/>
-          </a:ln>
-        </p:spPr>
-        <p:style>
-          <a:lnRef idx="2">
-            <a:schemeClr val="accent1">
-              <a:shade val="50000"/>
-            </a:schemeClr>
-          </a:lnRef>
-          <a:fillRef idx="1">
-            <a:schemeClr val="accent1"/>
-          </a:fillRef>
-          <a:effectRef idx="0">
-            <a:schemeClr val="accent1"/>
-          </a:effectRef>
-          <a:fontRef idx="minor">
-            <a:schemeClr val="lt1"/>
-          </a:fontRef>
-        </p:style>
-        <p:txBody>
-          <a:bodyPr rtlCol="0" anchor="ctr"/>
-          <a:lstStyle/>
-          <a:p>
-            <a:pPr algn="ctr"/>
-            <a:endParaRPr lang="nl-NL"/>
-          </a:p>
-        </p:txBody>
-      </p:sp>
-    </p:spTree>
-    <p:extLst>
-      <p:ext uri="{BB962C8B-B14F-4D97-AF65-F5344CB8AC3E}">
-        <p14:creationId xmlns:p14="http://schemas.microsoft.com/office/powerpoint/2010/main" val="2478428771"/>
-      </p:ext>
-    </p:extLst>
-  </p:cSld>
-  <p:clrMapOvr>
-    <a:masterClrMapping/>
-  </p:clrMapOvr>
-  <p:transition spd="slow">
-    <p:wipe/>
-  </p:transition>
-  <p:timing>
-    <p:tnLst>
-      <p:par>
-        <p:cTn id="1" dur="indefinite" restart="never" nodeType="tmRoot">
-          <p:childTnLst>
-            <p:seq concurrent="1" nextAc="seek">
-              <p:cTn id="2" dur="indefinite" nodeType="mainSeq">
-                <p:childTnLst>
-                  <p:par>
-                    <p:cTn id="3" fill="hold">
-                      <p:stCondLst>
-                        <p:cond delay="indefinite"/>
-                      </p:stCondLst>
-                      <p:childTnLst>
-                        <p:par>
-                          <p:cTn id="4" fill="hold">
-                            <p:stCondLst>
-                              <p:cond delay="0"/>
-                            </p:stCondLst>
-                            <p:childTnLst>
-                              <p:par>
-                                <p:cTn id="5" presetID="10" presetClass="entr" presetSubtype="0" fill="hold" grpId="0" nodeType="clickEffect">
-                                  <p:stCondLst>
-                                    <p:cond delay="0"/>
-                                  </p:stCondLst>
-                                  <p:childTnLst>
-                                    <p:set>
-                                      <p:cBhvr>
-                                        <p:cTn id="6" dur="1" fill="hold">
-                                          <p:stCondLst>
-                                            <p:cond delay="0"/>
-                                          </p:stCondLst>
-                                        </p:cTn>
-                                        <p:tgtEl>
-                                          <p:spTgt spid="2"/>
-                                        </p:tgtEl>
-                                        <p:attrNameLst>
-                                          <p:attrName>style.visibility</p:attrName>
-                                        </p:attrNameLst>
-                                      </p:cBhvr>
-                                      <p:to>
-                                        <p:strVal val="visible"/>
-                                      </p:to>
-                                    </p:set>
-                                    <p:animEffect transition="in" filter="fade">
-                                      <p:cBhvr>
-                                        <p:cTn id="7" dur="500"/>
-                                        <p:tgtEl>
-                                          <p:spTgt spid="2"/>
-                                        </p:tgtEl>
-                                      </p:cBhvr>
-                                    </p:animEffect>
-                                  </p:childTnLst>
-                                </p:cTn>
-                              </p:par>
-                              <p:par>
-                                <p:cTn id="8" presetID="24" presetClass="emph" presetSubtype="0" fill="hold" grpId="1" nodeType="withEffect">
-                                  <p:stCondLst>
-                                    <p:cond delay="0"/>
-                                  </p:stCondLst>
-                                  <p:childTnLst>
-                                    <p:animClr clrSpc="hsl" dir="cw">
-                                      <p:cBhvr override="childStyle">
-                                        <p:cTn id="9" dur="1000" fill="hold"/>
-                                        <p:tgtEl>
-                                          <p:spTgt spid="2"/>
-                                        </p:tgtEl>
-                                        <p:attrNameLst>
-                                          <p:attrName>style.color</p:attrName>
-                                        </p:attrNameLst>
-                                      </p:cBhvr>
-                                      <p:by>
-                                        <p:hsl h="0" s="-12549" l="-25098"/>
-                                      </p:by>
-                                    </p:animClr>
-                                    <p:animClr clrSpc="hsl" dir="cw">
-                                      <p:cBhvr>
-                                        <p:cTn id="10" dur="1000" fill="hold"/>
-                                        <p:tgtEl>
-                                          <p:spTgt spid="2"/>
-                                        </p:tgtEl>
-                                        <p:attrNameLst>
-                                          <p:attrName>fillcolor</p:attrName>
-                                        </p:attrNameLst>
-                                      </p:cBhvr>
-                                      <p:by>
-                                        <p:hsl h="0" s="-12549" l="-25098"/>
-                                      </p:by>
-                                    </p:animClr>
-                                    <p:animClr clrSpc="hsl" dir="cw">
-                                      <p:cBhvr>
-                                        <p:cTn id="11" dur="1000" fill="hold"/>
-                                        <p:tgtEl>
-                                          <p:spTgt spid="2"/>
-                                        </p:tgtEl>
-                                        <p:attrNameLst>
-                                          <p:attrName>stroke.color</p:attrName>
-                                        </p:attrNameLst>
-                                      </p:cBhvr>
-                                      <p:by>
-                                        <p:hsl h="0" s="-12549" l="-25098"/>
-                                      </p:by>
-                                    </p:animClr>
-                                    <p:set>
-                                      <p:cBhvr>
-                                        <p:cTn id="12" dur="1000" fill="hold"/>
-                                        <p:tgtEl>
-                                          <p:spTgt spid="2"/>
-                                        </p:tgtEl>
-                                        <p:attrNameLst>
-                                          <p:attrName>fill.type</p:attrName>
-                                        </p:attrNameLst>
-                                      </p:cBhvr>
-                                      <p:to>
-                                        <p:strVal val="solid"/>
-                                      </p:to>
-                                    </p:set>
-                                  </p:childTnLst>
-                                  <p:subTnLst>
-                                    <p:animClr clrSpc="rgb" dir="cw">
-                                      <p:cBhvr override="childStyle">
-                                        <p:cTn dur="1" fill="hold" display="0" masterRel="nextClick" afterEffect="1"/>
-                                        <p:tgtEl>
-                                          <p:spTgt spid="2"/>
-                                        </p:tgtEl>
-                                        <p:attrNameLst>
-                                          <p:attrName>ppt_c</p:attrName>
-                                        </p:attrNameLst>
-                                      </p:cBhvr>
-                                      <p:to>
-                                        <a:schemeClr val="folHlink"/>
-                                      </p:to>
-                                    </p:animClr>
-                                  </p:subTnLst>
-                                </p:cTn>
-                              </p:par>
-                              <p:par>
-                                <p:cTn id="13" presetID="10" presetClass="entr" presetSubtype="0" fill="hold" nodeType="withEffect">
-                                  <p:stCondLst>
-                                    <p:cond delay="0"/>
-                                  </p:stCondLst>
-                                  <p:childTnLst>
-                                    <p:set>
-                                      <p:cBhvr>
-                                        <p:cTn id="14" dur="1" fill="hold">
-                                          <p:stCondLst>
-                                            <p:cond delay="0"/>
-                                          </p:stCondLst>
-                                        </p:cTn>
-                                        <p:tgtEl>
-                                          <p:spTgt spid="17"/>
-                                        </p:tgtEl>
-                                        <p:attrNameLst>
-                                          <p:attrName>style.visibility</p:attrName>
-                                        </p:attrNameLst>
-                                      </p:cBhvr>
-                                      <p:to>
-                                        <p:strVal val="visible"/>
-                                      </p:to>
-                                    </p:set>
-                                    <p:animEffect transition="in" filter="fade">
-                                      <p:cBhvr>
-                                        <p:cTn id="15" dur="500"/>
-                                        <p:tgtEl>
-                                          <p:spTgt spid="17"/>
-                                        </p:tgtEl>
-                                      </p:cBhvr>
-                                    </p:animEffect>
-                                  </p:childTnLst>
-                                </p:cTn>
-                              </p:par>
-                              <p:par>
-                                <p:cTn id="16" presetID="10" presetClass="entr" presetSubtype="0" fill="hold" nodeType="withEffect">
-                                  <p:stCondLst>
-                                    <p:cond delay="0"/>
-                                  </p:stCondLst>
-                                  <p:childTnLst>
-                                    <p:set>
-                                      <p:cBhvr>
-                                        <p:cTn id="17" dur="1" fill="hold">
-                                          <p:stCondLst>
-                                            <p:cond delay="0"/>
-                                          </p:stCondLst>
-                                        </p:cTn>
-                                        <p:tgtEl>
-                                          <p:spTgt spid="13"/>
-                                        </p:tgtEl>
-                                        <p:attrNameLst>
-                                          <p:attrName>style.visibility</p:attrName>
-                                        </p:attrNameLst>
-                                      </p:cBhvr>
-                                      <p:to>
-                                        <p:strVal val="visible"/>
-                                      </p:to>
-                                    </p:set>
-                                    <p:animEffect transition="in" filter="fade">
-                                      <p:cBhvr>
-                                        <p:cTn id="18" dur="500"/>
-                                        <p:tgtEl>
-                                          <p:spTgt spid="13"/>
-                                        </p:tgtEl>
-                                      </p:cBhvr>
-                                    </p:animEffect>
-                                  </p:childTnLst>
-                                </p:cTn>
-                              </p:par>
-                              <p:par>
-                                <p:cTn id="19" presetID="10" presetClass="entr" presetSubtype="0" fill="hold" nodeType="withEffect">
-                                  <p:stCondLst>
-                                    <p:cond delay="0"/>
-                                  </p:stCondLst>
-                                  <p:childTnLst>
-                                    <p:set>
-                                      <p:cBhvr>
-                                        <p:cTn id="20" dur="1" fill="hold">
-                                          <p:stCondLst>
-                                            <p:cond delay="0"/>
-                                          </p:stCondLst>
-                                        </p:cTn>
-                                        <p:tgtEl>
-                                          <p:spTgt spid="16"/>
-                                        </p:tgtEl>
-                                        <p:attrNameLst>
-                                          <p:attrName>style.visibility</p:attrName>
-                                        </p:attrNameLst>
-                                      </p:cBhvr>
-                                      <p:to>
-                                        <p:strVal val="visible"/>
-                                      </p:to>
-                                    </p:set>
-                                    <p:animEffect transition="in" filter="fade">
-                                      <p:cBhvr>
-                                        <p:cTn id="21" dur="500"/>
-                                        <p:tgtEl>
-                                          <p:spTgt spid="16"/>
-                                        </p:tgtEl>
-                                      </p:cBhvr>
-                                    </p:animEffect>
-                                  </p:childTnLst>
-                                </p:cTn>
-                              </p:par>
-                              <p:par>
-                                <p:cTn id="22" presetID="10" presetClass="entr" presetSubtype="0" fill="hold" nodeType="withEffect">
-                                  <p:stCondLst>
-                                    <p:cond delay="0"/>
-                                  </p:stCondLst>
-                                  <p:childTnLst>
-                                    <p:set>
-                                      <p:cBhvr>
-                                        <p:cTn id="23" dur="1" fill="hold">
-                                          <p:stCondLst>
-                                            <p:cond delay="0"/>
-                                          </p:stCondLst>
-                                        </p:cTn>
-                                        <p:tgtEl>
-                                          <p:spTgt spid="18"/>
-                                        </p:tgtEl>
-                                        <p:attrNameLst>
-                                          <p:attrName>style.visibility</p:attrName>
-                                        </p:attrNameLst>
-                                      </p:cBhvr>
-                                      <p:to>
-                                        <p:strVal val="visible"/>
-                                      </p:to>
-                                    </p:set>
-                                    <p:animEffect transition="in" filter="fade">
-                                      <p:cBhvr>
-                                        <p:cTn id="24" dur="500"/>
-                                        <p:tgtEl>
-                                          <p:spTgt spid="18"/>
-                                        </p:tgtEl>
-                                      </p:cBhvr>
-                                    </p:animEffect>
-                                  </p:childTnLst>
-                                </p:cTn>
-                              </p:par>
-                              <p:par>
-                                <p:cTn id="25" presetID="10" presetClass="entr" presetSubtype="0" fill="hold" nodeType="withEffect">
-                                  <p:stCondLst>
-                                    <p:cond delay="0"/>
-                                  </p:stCondLst>
-                                  <p:childTnLst>
-                                    <p:set>
-                                      <p:cBhvr>
-                                        <p:cTn id="26" dur="1" fill="hold">
-                                          <p:stCondLst>
-                                            <p:cond delay="0"/>
-                                          </p:stCondLst>
-                                        </p:cTn>
-                                        <p:tgtEl>
-                                          <p:spTgt spid="8"/>
-                                        </p:tgtEl>
-                                        <p:attrNameLst>
-                                          <p:attrName>style.visibility</p:attrName>
-                                        </p:attrNameLst>
-                                      </p:cBhvr>
-                                      <p:to>
-                                        <p:strVal val="visible"/>
-                                      </p:to>
-                                    </p:set>
-                                    <p:animEffect transition="in" filter="fade">
-                                      <p:cBhvr>
-                                        <p:cTn id="27" dur="500"/>
-                                        <p:tgtEl>
-                                          <p:spTgt spid="8"/>
-                                        </p:tgtEl>
-                                      </p:cBhvr>
-                                    </p:animEffect>
-                                  </p:childTnLst>
-                                </p:cTn>
-                              </p:par>
-                            </p:childTnLst>
-                          </p:cTn>
-                        </p:par>
-                      </p:childTnLst>
-                    </p:cTn>
-                  </p:par>
-                  <p:par>
-                    <p:cTn id="28" fill="hold">
-                      <p:stCondLst>
-                        <p:cond delay="indefinite"/>
-                      </p:stCondLst>
-                      <p:childTnLst>
-                        <p:par>
-                          <p:cTn id="29" fill="hold">
-                            <p:stCondLst>
-                              <p:cond delay="0"/>
-                            </p:stCondLst>
-                            <p:childTnLst>
-                              <p:par>
-                                <p:cTn id="30" presetID="10" presetClass="entr" presetSubtype="0" fill="hold" grpId="0" nodeType="clickEffect">
-                                  <p:stCondLst>
-                                    <p:cond delay="0"/>
-                                  </p:stCondLst>
-                                  <p:childTnLst>
-                                    <p:set>
-                                      <p:cBhvr>
-                                        <p:cTn id="31" dur="1" fill="hold">
-                                          <p:stCondLst>
-                                            <p:cond delay="0"/>
-                                          </p:stCondLst>
-                                        </p:cTn>
-                                        <p:tgtEl>
-                                          <p:spTgt spid="3"/>
-                                        </p:tgtEl>
-                                        <p:attrNameLst>
-                                          <p:attrName>style.visibility</p:attrName>
-                                        </p:attrNameLst>
-                                      </p:cBhvr>
-                                      <p:to>
-                                        <p:strVal val="visible"/>
-                                      </p:to>
-                                    </p:set>
-                                    <p:animEffect transition="in" filter="fade">
-                                      <p:cBhvr>
-                                        <p:cTn id="32" dur="500"/>
-                                        <p:tgtEl>
-                                          <p:spTgt spid="3"/>
-                                        </p:tgtEl>
-                                      </p:cBhvr>
-                                    </p:animEffect>
-                                  </p:childTnLst>
-                                </p:cTn>
-                              </p:par>
-                              <p:par>
-                                <p:cTn id="33" presetID="10" presetClass="entr" presetSubtype="0" fill="hold" grpId="0" nodeType="withEffect">
-                                  <p:stCondLst>
-                                    <p:cond delay="0"/>
-                                  </p:stCondLst>
-                                  <p:childTnLst>
-                                    <p:set>
-                                      <p:cBhvr>
-                                        <p:cTn id="34" dur="1" fill="hold">
-                                          <p:stCondLst>
-                                            <p:cond delay="0"/>
-                                          </p:stCondLst>
-                                        </p:cTn>
-                                        <p:tgtEl>
-                                          <p:spTgt spid="33"/>
-                                        </p:tgtEl>
-                                        <p:attrNameLst>
-                                          <p:attrName>style.visibility</p:attrName>
-                                        </p:attrNameLst>
-                                      </p:cBhvr>
-                                      <p:to>
-                                        <p:strVal val="visible"/>
-                                      </p:to>
-                                    </p:set>
-                                    <p:animEffect transition="in" filter="fade">
-                                      <p:cBhvr>
-                                        <p:cTn id="35" dur="500"/>
-                                        <p:tgtEl>
-                                          <p:spTgt spid="33"/>
-                                        </p:tgtEl>
-                                      </p:cBhvr>
-                                    </p:animEffect>
-                                  </p:childTnLst>
-                                </p:cTn>
-                              </p:par>
-                            </p:childTnLst>
-                          </p:cTn>
-                        </p:par>
-                      </p:childTnLst>
-                    </p:cTn>
-                  </p:par>
-                  <p:par>
-                    <p:cTn id="36" fill="hold">
-                      <p:stCondLst>
-                        <p:cond delay="indefinite"/>
-                      </p:stCondLst>
-                      <p:childTnLst>
-                        <p:par>
-                          <p:cTn id="37" fill="hold">
-                            <p:stCondLst>
-                              <p:cond delay="0"/>
-                            </p:stCondLst>
-                            <p:childTnLst>
-                              <p:par>
-                                <p:cTn id="38" presetID="10" presetClass="entr" presetSubtype="0" fill="hold" grpId="0" nodeType="clickEffect">
-                                  <p:stCondLst>
-                                    <p:cond delay="0"/>
-                                  </p:stCondLst>
-                                  <p:childTnLst>
-                                    <p:set>
-                                      <p:cBhvr>
-                                        <p:cTn id="39" dur="1" fill="hold">
-                                          <p:stCondLst>
-                                            <p:cond delay="0"/>
-                                          </p:stCondLst>
-                                        </p:cTn>
-                                        <p:tgtEl>
-                                          <p:spTgt spid="27"/>
-                                        </p:tgtEl>
-                                        <p:attrNameLst>
-                                          <p:attrName>style.visibility</p:attrName>
-                                        </p:attrNameLst>
-                                      </p:cBhvr>
-                                      <p:to>
-                                        <p:strVal val="visible"/>
-                                      </p:to>
-                                    </p:set>
-                                    <p:animEffect transition="in" filter="fade">
-                                      <p:cBhvr>
-                                        <p:cTn id="40" dur="500"/>
-                                        <p:tgtEl>
-                                          <p:spTgt spid="27"/>
-                                        </p:tgtEl>
-                                      </p:cBhvr>
-                                    </p:animEffect>
-                                  </p:childTnLst>
-                                </p:cTn>
-                              </p:par>
-                              <p:par>
-                                <p:cTn id="41" presetID="10" presetClass="entr" presetSubtype="0" fill="hold" grpId="0" nodeType="withEffect">
-                                  <p:stCondLst>
-                                    <p:cond delay="0"/>
-                                  </p:stCondLst>
-                                  <p:childTnLst>
-                                    <p:set>
-                                      <p:cBhvr>
-                                        <p:cTn id="42" dur="1" fill="hold">
-                                          <p:stCondLst>
-                                            <p:cond delay="0"/>
-                                          </p:stCondLst>
-                                        </p:cTn>
-                                        <p:tgtEl>
-                                          <p:spTgt spid="28"/>
-                                        </p:tgtEl>
-                                        <p:attrNameLst>
-                                          <p:attrName>style.visibility</p:attrName>
-                                        </p:attrNameLst>
-                                      </p:cBhvr>
-                                      <p:to>
-                                        <p:strVal val="visible"/>
-                                      </p:to>
-                                    </p:set>
-                                    <p:animEffect transition="in" filter="fade">
-                                      <p:cBhvr>
-                                        <p:cTn id="43" dur="500"/>
-                                        <p:tgtEl>
-                                          <p:spTgt spid="28"/>
-                                        </p:tgtEl>
-                                      </p:cBhvr>
-                                    </p:animEffect>
-                                  </p:childTnLst>
-                                </p:cTn>
-                              </p:par>
-                            </p:childTnLst>
-                          </p:cTn>
-                        </p:par>
-                      </p:childTnLst>
-                    </p:cTn>
-                  </p:par>
-                  <p:par>
-                    <p:cTn id="44" fill="hold">
-                      <p:stCondLst>
-                        <p:cond delay="indefinite"/>
-                      </p:stCondLst>
-                      <p:childTnLst>
-                        <p:par>
-                          <p:cTn id="45" fill="hold">
-                            <p:stCondLst>
-                              <p:cond delay="0"/>
-                            </p:stCondLst>
-                            <p:childTnLst>
-                              <p:par>
-                                <p:cTn id="46" presetID="10" presetClass="entr" presetSubtype="0" fill="hold" grpId="0" nodeType="clickEffect">
-                                  <p:stCondLst>
-                                    <p:cond delay="0"/>
-                                  </p:stCondLst>
-                                  <p:childTnLst>
-                                    <p:set>
-                                      <p:cBhvr>
-                                        <p:cTn id="47" dur="1" fill="hold">
-                                          <p:stCondLst>
-                                            <p:cond delay="0"/>
-                                          </p:stCondLst>
-                                        </p:cTn>
-                                        <p:tgtEl>
-                                          <p:spTgt spid="26"/>
-                                        </p:tgtEl>
-                                        <p:attrNameLst>
-                                          <p:attrName>style.visibility</p:attrName>
-                                        </p:attrNameLst>
-                                      </p:cBhvr>
-                                      <p:to>
-                                        <p:strVal val="visible"/>
-                                      </p:to>
-                                    </p:set>
-                                    <p:animEffect transition="in" filter="fade">
-                                      <p:cBhvr>
-                                        <p:cTn id="48" dur="500"/>
-                                        <p:tgtEl>
-                                          <p:spTgt spid="26"/>
-                                        </p:tgtEl>
-                                      </p:cBhvr>
-                                    </p:animEffect>
-                                  </p:childTnLst>
-                                </p:cTn>
-                              </p:par>
-                              <p:par>
-                                <p:cTn id="49" presetID="10" presetClass="entr" presetSubtype="0" fill="hold" grpId="0" nodeType="withEffect">
-                                  <p:stCondLst>
-                                    <p:cond delay="0"/>
-                                  </p:stCondLst>
-                                  <p:childTnLst>
-                                    <p:set>
-                                      <p:cBhvr>
-                                        <p:cTn id="50" dur="1" fill="hold">
-                                          <p:stCondLst>
-                                            <p:cond delay="0"/>
-                                          </p:stCondLst>
-                                        </p:cTn>
-                                        <p:tgtEl>
-                                          <p:spTgt spid="35"/>
-                                        </p:tgtEl>
-                                        <p:attrNameLst>
-                                          <p:attrName>style.visibility</p:attrName>
-                                        </p:attrNameLst>
-                                      </p:cBhvr>
-                                      <p:to>
-                                        <p:strVal val="visible"/>
-                                      </p:to>
-                                    </p:set>
-                                    <p:animEffect transition="in" filter="fade">
-                                      <p:cBhvr>
-                                        <p:cTn id="51" dur="500"/>
-                                        <p:tgtEl>
-                                          <p:spTgt spid="35"/>
-                                        </p:tgtEl>
-                                      </p:cBhvr>
-                                    </p:animEffect>
-                                  </p:childTnLst>
-                                </p:cTn>
-                              </p:par>
-                            </p:childTnLst>
-                          </p:cTn>
-                        </p:par>
-                      </p:childTnLst>
-                    </p:cTn>
-                  </p:par>
-                  <p:par>
-                    <p:cTn id="52" fill="hold">
-                      <p:stCondLst>
-                        <p:cond delay="indefinite"/>
-                      </p:stCondLst>
-                      <p:childTnLst>
-                        <p:par>
-                          <p:cTn id="53" fill="hold">
-                            <p:stCondLst>
-                              <p:cond delay="0"/>
-                            </p:stCondLst>
-                            <p:childTnLst>
-                              <p:par>
-                                <p:cTn id="54" presetID="10" presetClass="entr" presetSubtype="0" fill="hold" grpId="0" nodeType="clickEffect">
-                                  <p:stCondLst>
-                                    <p:cond delay="0"/>
-                                  </p:stCondLst>
-                                  <p:childTnLst>
-                                    <p:set>
-                                      <p:cBhvr>
-                                        <p:cTn id="55" dur="1" fill="hold">
-                                          <p:stCondLst>
-                                            <p:cond delay="0"/>
-                                          </p:stCondLst>
-                                        </p:cTn>
-                                        <p:tgtEl>
-                                          <p:spTgt spid="31"/>
-                                        </p:tgtEl>
-                                        <p:attrNameLst>
-                                          <p:attrName>style.visibility</p:attrName>
-                                        </p:attrNameLst>
-                                      </p:cBhvr>
-                                      <p:to>
-                                        <p:strVal val="visible"/>
-                                      </p:to>
-                                    </p:set>
-                                    <p:animEffect transition="in" filter="fade">
-                                      <p:cBhvr>
-                                        <p:cTn id="56" dur="500"/>
-                                        <p:tgtEl>
-                                          <p:spTgt spid="31"/>
-                                        </p:tgtEl>
-                                      </p:cBhvr>
-                                    </p:animEffect>
-                                  </p:childTnLst>
-                                </p:cTn>
-                              </p:par>
-                              <p:par>
-                                <p:cTn id="57" presetID="10" presetClass="entr" presetSubtype="0" fill="hold" grpId="0" nodeType="withEffect">
-                                  <p:stCondLst>
-                                    <p:cond delay="0"/>
-                                  </p:stCondLst>
-                                  <p:childTnLst>
-                                    <p:set>
-                                      <p:cBhvr>
-                                        <p:cTn id="58" dur="1" fill="hold">
-                                          <p:stCondLst>
-                                            <p:cond delay="0"/>
-                                          </p:stCondLst>
-                                        </p:cTn>
-                                        <p:tgtEl>
-                                          <p:spTgt spid="34"/>
-                                        </p:tgtEl>
-                                        <p:attrNameLst>
-                                          <p:attrName>style.visibility</p:attrName>
-                                        </p:attrNameLst>
-                                      </p:cBhvr>
-                                      <p:to>
-                                        <p:strVal val="visible"/>
-                                      </p:to>
-                                    </p:set>
-                                    <p:animEffect transition="in" filter="fade">
-                                      <p:cBhvr>
-                                        <p:cTn id="59" dur="500"/>
-                                        <p:tgtEl>
-                                          <p:spTgt spid="34"/>
-                                        </p:tgtEl>
-                                      </p:cBhvr>
-                                    </p:animEffect>
-                                  </p:childTnLst>
-                                </p:cTn>
-                              </p:par>
-                            </p:childTnLst>
-                          </p:cTn>
-                        </p:par>
-                      </p:childTnLst>
-                    </p:cTn>
-                  </p:par>
-                </p:childTnLst>
-              </p:cTn>
-              <p:prevCondLst>
-                <p:cond evt="onPrev" delay="0">
-                  <p:tgtEl>
-                    <p:sldTgt/>
-                  </p:tgtEl>
-                </p:cond>
-              </p:prevCondLst>
-              <p:nextCondLst>
-                <p:cond evt="onNext" delay="0">
-                  <p:tgtEl>
-                    <p:sldTgt/>
-                  </p:tgtEl>
-                </p:cond>
-              </p:nextCondLst>
-            </p:seq>
-          </p:childTnLst>
-        </p:cTn>
-      </p:par>
-    </p:tnLst>
-    <p:bldLst>
-      <p:bldP spid="2" grpId="0"/>
-      <p:bldP spid="2" grpId="1"/>
-      <p:bldP spid="26" grpId="0" animBg="1"/>
-      <p:bldP spid="28" grpId="0" animBg="1"/>
-      <p:bldP spid="31" grpId="0" animBg="1"/>
-      <p:bldP spid="27" grpId="0"/>
-      <p:bldP spid="33" grpId="0"/>
-      <p:bldP spid="34" grpId="0"/>
-      <p:bldP spid="35" grpId="0"/>
-      <p:bldP spid="3" grpId="0" animBg="1"/>
-    </p:bldLst>
-  </p:timing>
-</p:sld>
-</file>
-
 <file path=ppt/theme/theme1.xml><?xml version="1.0" encoding="utf-8"?>
 <a:theme xmlns:a="http://schemas.openxmlformats.org/drawingml/2006/main" name="Ion">
   <a:themeElements>

</xml_diff>

<commit_message>
Powerpoint verbeterd + deel programmatie bijgevoegd
</commit_message>
<xml_diff>
--- a/_Administratie/Presentatie GIP.pptx
+++ b/_Administratie/Presentatie GIP.pptx
@@ -8464,7 +8464,7 @@
             </a:pPr>
             <a:r>
               <a:rPr lang="nl-NL" sz="3600" dirty="0"/>
-              <a:t>verbinding</a:t>
+              <a:t>Verbinding</a:t>
             </a:r>
           </a:p>
           <a:p>
@@ -11687,7 +11687,7 @@
             </a:pPr>
             <a:r>
               <a:rPr lang="nl-NL" sz="3600" dirty="0"/>
-              <a:t>tijdsgebrek</a:t>
+              <a:t>Tijdsgebrek</a:t>
             </a:r>
           </a:p>
         </p:txBody>
@@ -12368,13 +12368,8 @@
             </a:pPr>
             <a:r>
               <a:rPr lang="nl-NL" sz="3600" dirty="0"/>
-              <a:t>Marktleider </a:t>
+              <a:t>Marktleider Europa</a:t>
             </a:r>
-            <a:r>
-              <a:rPr lang="nl-NL" sz="3600" dirty="0" err="1"/>
-              <a:t>europa</a:t>
-            </a:r>
-            <a:endParaRPr lang="nl-NL" sz="3600" dirty="0"/>
           </a:p>
         </p:txBody>
       </p:sp>
@@ -12407,8 +12402,8 @@
         </p:blipFill>
         <p:spPr bwMode="auto">
           <a:xfrm>
-            <a:off x="6514903" y="2060575"/>
-            <a:ext cx="5080065" cy="2963371"/>
+            <a:off x="6928064" y="3032126"/>
+            <a:ext cx="4657379" cy="2716804"/>
           </a:xfrm>
           <a:prstGeom prst="rect">
             <a:avLst/>
@@ -13509,7 +13504,7 @@
             </a:pPr>
             <a:r>
               <a:rPr lang="nl-NL" sz="3600" dirty="0"/>
-              <a:t>Project sprankel</a:t>
+              <a:t>Project De Sprankel</a:t>
             </a:r>
           </a:p>
         </p:txBody>
@@ -14074,7 +14069,7 @@
             </a:pPr>
             <a:r>
               <a:rPr lang="nl-NL" sz="3600" dirty="0"/>
-              <a:t>Goed</a:t>
+              <a:t>Mooie feedback</a:t>
             </a:r>
           </a:p>
           <a:p>
@@ -14378,7 +14373,7 @@
                                         <p:tgtEl>
                                           <p:spTgt spid="3">
                                             <p:txEl>
-                                              <p:pRg st="0" end="0"/>
+                                              <p:pRg st="1" end="1"/>
                                             </p:txEl>
                                           </p:spTgt>
                                         </p:tgtEl>
@@ -14396,7 +14391,7 @@
                                         <p:tgtEl>
                                           <p:spTgt spid="3">
                                             <p:txEl>
-                                              <p:pRg st="0" end="0"/>
+                                              <p:pRg st="1" end="1"/>
                                             </p:txEl>
                                           </p:spTgt>
                                         </p:tgtEl>
@@ -14439,7 +14434,7 @@
                                         <p:tgtEl>
                                           <p:spTgt spid="3">
                                             <p:txEl>
-                                              <p:pRg st="1" end="1"/>
+                                              <p:pRg st="0" end="0"/>
                                             </p:txEl>
                                           </p:spTgt>
                                         </p:tgtEl>
@@ -14457,93 +14452,12 @@
                                         <p:tgtEl>
                                           <p:spTgt spid="3">
                                             <p:txEl>
-                                              <p:pRg st="1" end="1"/>
-                                            </p:txEl>
-                                          </p:spTgt>
-                                        </p:tgtEl>
-                                      </p:cBhvr>
-                                    </p:animEffect>
-                                  </p:childTnLst>
-                                </p:cTn>
-                              </p:par>
-                              <p:par>
-                                <p:cTn id="23" presetID="24" presetClass="emph" presetSubtype="0" fill="hold" nodeType="withEffect">
-                                  <p:stCondLst>
-                                    <p:cond delay="0"/>
-                                  </p:stCondLst>
-                                  <p:childTnLst>
-                                    <p:animClr clrSpc="hsl" dir="cw">
-                                      <p:cBhvr override="childStyle">
-                                        <p:cTn id="24" dur="500" fill="hold"/>
-                                        <p:tgtEl>
-                                          <p:spTgt spid="3">
-                                            <p:txEl>
                                               <p:pRg st="0" end="0"/>
                                             </p:txEl>
                                           </p:spTgt>
                                         </p:tgtEl>
-                                        <p:attrNameLst>
-                                          <p:attrName>style.color</p:attrName>
-                                        </p:attrNameLst>
-                                      </p:cBhvr>
-                                      <p:by>
-                                        <p:hsl h="0" s="-12549" l="-25098"/>
-                                      </p:by>
-                                    </p:animClr>
-                                    <p:animClr clrSpc="hsl" dir="cw">
-                                      <p:cBhvr>
-                                        <p:cTn id="25" dur="500" fill="hold"/>
-                                        <p:tgtEl>
-                                          <p:spTgt spid="3">
-                                            <p:txEl>
-                                              <p:pRg st="0" end="0"/>
-                                            </p:txEl>
-                                          </p:spTgt>
-                                        </p:tgtEl>
-                                        <p:attrNameLst>
-                                          <p:attrName>fillcolor</p:attrName>
-                                        </p:attrNameLst>
-                                      </p:cBhvr>
-                                      <p:by>
-                                        <p:hsl h="0" s="-12549" l="-25098"/>
-                                      </p:by>
-                                    </p:animClr>
-                                    <p:animClr clrSpc="hsl" dir="cw">
-                                      <p:cBhvr>
-                                        <p:cTn id="26" dur="500" fill="hold"/>
-                                        <p:tgtEl>
-                                          <p:spTgt spid="3">
-                                            <p:txEl>
-                                              <p:pRg st="0" end="0"/>
-                                            </p:txEl>
-                                          </p:spTgt>
-                                        </p:tgtEl>
-                                        <p:attrNameLst>
-                                          <p:attrName>stroke.color</p:attrName>
-                                        </p:attrNameLst>
-                                      </p:cBhvr>
-                                      <p:by>
-                                        <p:hsl h="0" s="-12549" l="-25098"/>
-                                      </p:by>
-                                    </p:animClr>
-                                    <p:set>
-                                      <p:cBhvr>
-                                        <p:cTn id="27" dur="500" fill="hold"/>
-                                        <p:tgtEl>
-                                          <p:spTgt spid="3">
-                                            <p:txEl>
-                                              <p:pRg st="0" end="0"/>
-                                            </p:txEl>
-                                          </p:spTgt>
-                                        </p:tgtEl>
-                                        <p:attrNameLst>
-                                          <p:attrName>fill.type</p:attrName>
-                                        </p:attrNameLst>
-                                      </p:cBhvr>
-                                      <p:to>
-                                        <p:strVal val="solid"/>
-                                      </p:to>
-                                    </p:set>
+                                      </p:cBhvr>
+                                    </p:animEffect>
                                   </p:childTnLst>
                                 </p:cTn>
                               </p:par>
@@ -16989,7 +16903,7 @@
             </a:pPr>
             <a:r>
               <a:rPr lang="nl-NL" sz="3600" dirty="0"/>
-              <a:t>promotie</a:t>
+              <a:t>Promotie</a:t>
             </a:r>
           </a:p>
         </p:txBody>
@@ -17024,7 +16938,7 @@
             </a:pPr>
             <a:r>
               <a:rPr lang="nl-NL" sz="3600" dirty="0"/>
-              <a:t>administratie</a:t>
+              <a:t>Administratie</a:t>
             </a:r>
           </a:p>
           <a:p>
@@ -17836,7 +17750,7 @@
             </a:pPr>
             <a:r>
               <a:rPr lang="nl-NL" sz="3600" dirty="0"/>
-              <a:t>administratieve</a:t>
+              <a:t>Administratie</a:t>
             </a:r>
           </a:p>
         </p:txBody>
@@ -18736,7 +18650,7 @@
             </a:pPr>
             <a:r>
               <a:rPr lang="nl-NL" sz="3600" dirty="0"/>
-              <a:t>Redelijk resultaat</a:t>
+              <a:t>Behoorlijk resultaat</a:t>
             </a:r>
           </a:p>
           <a:p>
@@ -18748,7 +18662,7 @@
             </a:pPr>
             <a:r>
               <a:rPr lang="nl-NL" sz="3600" dirty="0"/>
-              <a:t>Afsluit</a:t>
+              <a:t>Afsluiting</a:t>
             </a:r>
           </a:p>
         </p:txBody>

</xml_diff>